<commit_message>
0609 (docs udt) 신유진
</commit_message>
<xml_diff>
--- a/docs/pagesketch.pptx
+++ b/docs/pagesketch.pptx
@@ -249,7 +249,7 @@
           <a:p>
             <a:fld id="{7E81BBBE-41CB-43CE-BF50-4DD127181052}" type="datetimeFigureOut">
               <a:rPr lang="ko-KR" altLang="en-US" smtClean="0"/>
-              <a:t>2023-06-07</a:t>
+              <a:t>2023-06-08</a:t>
             </a:fld>
             <a:endParaRPr lang="ko-KR" altLang="en-US"/>
           </a:p>
@@ -419,7 +419,7 @@
           <a:p>
             <a:fld id="{7E81BBBE-41CB-43CE-BF50-4DD127181052}" type="datetimeFigureOut">
               <a:rPr lang="ko-KR" altLang="en-US" smtClean="0"/>
-              <a:t>2023-06-07</a:t>
+              <a:t>2023-06-08</a:t>
             </a:fld>
             <a:endParaRPr lang="ko-KR" altLang="en-US"/>
           </a:p>
@@ -599,7 +599,7 @@
           <a:p>
             <a:fld id="{7E81BBBE-41CB-43CE-BF50-4DD127181052}" type="datetimeFigureOut">
               <a:rPr lang="ko-KR" altLang="en-US" smtClean="0"/>
-              <a:t>2023-06-07</a:t>
+              <a:t>2023-06-08</a:t>
             </a:fld>
             <a:endParaRPr lang="ko-KR" altLang="en-US"/>
           </a:p>
@@ -769,7 +769,7 @@
           <a:p>
             <a:fld id="{7E81BBBE-41CB-43CE-BF50-4DD127181052}" type="datetimeFigureOut">
               <a:rPr lang="ko-KR" altLang="en-US" smtClean="0"/>
-              <a:t>2023-06-07</a:t>
+              <a:t>2023-06-08</a:t>
             </a:fld>
             <a:endParaRPr lang="ko-KR" altLang="en-US"/>
           </a:p>
@@ -1015,7 +1015,7 @@
           <a:p>
             <a:fld id="{7E81BBBE-41CB-43CE-BF50-4DD127181052}" type="datetimeFigureOut">
               <a:rPr lang="ko-KR" altLang="en-US" smtClean="0"/>
-              <a:t>2023-06-07</a:t>
+              <a:t>2023-06-08</a:t>
             </a:fld>
             <a:endParaRPr lang="ko-KR" altLang="en-US"/>
           </a:p>
@@ -1247,7 +1247,7 @@
           <a:p>
             <a:fld id="{7E81BBBE-41CB-43CE-BF50-4DD127181052}" type="datetimeFigureOut">
               <a:rPr lang="ko-KR" altLang="en-US" smtClean="0"/>
-              <a:t>2023-06-07</a:t>
+              <a:t>2023-06-08</a:t>
             </a:fld>
             <a:endParaRPr lang="ko-KR" altLang="en-US"/>
           </a:p>
@@ -1614,7 +1614,7 @@
           <a:p>
             <a:fld id="{7E81BBBE-41CB-43CE-BF50-4DD127181052}" type="datetimeFigureOut">
               <a:rPr lang="ko-KR" altLang="en-US" smtClean="0"/>
-              <a:t>2023-06-07</a:t>
+              <a:t>2023-06-08</a:t>
             </a:fld>
             <a:endParaRPr lang="ko-KR" altLang="en-US"/>
           </a:p>
@@ -1732,7 +1732,7 @@
           <a:p>
             <a:fld id="{7E81BBBE-41CB-43CE-BF50-4DD127181052}" type="datetimeFigureOut">
               <a:rPr lang="ko-KR" altLang="en-US" smtClean="0"/>
-              <a:t>2023-06-07</a:t>
+              <a:t>2023-06-08</a:t>
             </a:fld>
             <a:endParaRPr lang="ko-KR" altLang="en-US"/>
           </a:p>
@@ -1827,7 +1827,7 @@
           <a:p>
             <a:fld id="{7E81BBBE-41CB-43CE-BF50-4DD127181052}" type="datetimeFigureOut">
               <a:rPr lang="ko-KR" altLang="en-US" smtClean="0"/>
-              <a:t>2023-06-07</a:t>
+              <a:t>2023-06-08</a:t>
             </a:fld>
             <a:endParaRPr lang="ko-KR" altLang="en-US"/>
           </a:p>
@@ -2104,7 +2104,7 @@
           <a:p>
             <a:fld id="{7E81BBBE-41CB-43CE-BF50-4DD127181052}" type="datetimeFigureOut">
               <a:rPr lang="ko-KR" altLang="en-US" smtClean="0"/>
-              <a:t>2023-06-07</a:t>
+              <a:t>2023-06-08</a:t>
             </a:fld>
             <a:endParaRPr lang="ko-KR" altLang="en-US"/>
           </a:p>
@@ -2357,7 +2357,7 @@
           <a:p>
             <a:fld id="{7E81BBBE-41CB-43CE-BF50-4DD127181052}" type="datetimeFigureOut">
               <a:rPr lang="ko-KR" altLang="en-US" smtClean="0"/>
-              <a:t>2023-06-07</a:t>
+              <a:t>2023-06-08</a:t>
             </a:fld>
             <a:endParaRPr lang="ko-KR" altLang="en-US"/>
           </a:p>
@@ -2570,7 +2570,7 @@
           <a:p>
             <a:fld id="{7E81BBBE-41CB-43CE-BF50-4DD127181052}" type="datetimeFigureOut">
               <a:rPr lang="ko-KR" altLang="en-US" smtClean="0"/>
-              <a:t>2023-06-07</a:t>
+              <a:t>2023-06-08</a:t>
             </a:fld>
             <a:endParaRPr lang="ko-KR" altLang="en-US"/>
           </a:p>
@@ -4429,7 +4429,7 @@
         <p:spPr>
           <a:xfrm>
             <a:off x="1497644" y="4462353"/>
-            <a:ext cx="2428870" cy="246221"/>
+            <a:ext cx="2060179" cy="246221"/>
           </a:xfrm>
           <a:prstGeom prst="rect">
             <a:avLst/>
@@ -4448,7 +4448,15 @@
                   <a:srgbClr val="FF0000"/>
                 </a:solidFill>
               </a:rPr>
-              <a:t>📢 공지사항입니다</a:t>
+              <a:t>📢 </a:t>
+            </a:r>
+            <a:r>
+              <a:rPr lang="ko-KR" altLang="en-US" sz="1000" dirty="0" smtClean="0">
+                <a:solidFill>
+                  <a:srgbClr val="FF0000"/>
+                </a:solidFill>
+              </a:rPr>
+              <a:t>공지사항 </a:t>
             </a:r>
             <a:r>
               <a:rPr lang="en-US" altLang="ko-KR" sz="1000" dirty="0" smtClean="0">
@@ -4456,7 +4464,7 @@
                   <a:srgbClr val="FF0000"/>
                 </a:solidFill>
               </a:rPr>
-              <a:t>. </a:t>
+              <a:t> </a:t>
             </a:r>
             <a:r>
               <a:rPr lang="ko-KR" altLang="en-US" sz="1000" dirty="0" err="1" smtClean="0">
@@ -4861,29 +4869,6 @@
           <a:chExt cx="0" cy="0"/>
         </a:xfrm>
       </p:grpSpPr>
-      <p:pic>
-        <p:nvPicPr>
-          <p:cNvPr id="47" name="그림 46"/>
-          <p:cNvPicPr>
-            <a:picLocks noChangeAspect="1"/>
-          </p:cNvPicPr>
-          <p:nvPr/>
-        </p:nvPicPr>
-        <p:blipFill rotWithShape="1">
-          <a:blip r:embed="rId2"/>
-          <a:srcRect t="9017"/>
-          <a:stretch/>
-        </p:blipFill>
-        <p:spPr>
-          <a:xfrm>
-            <a:off x="1298168" y="1785844"/>
-            <a:ext cx="3918552" cy="4061287"/>
-          </a:xfrm>
-          <a:prstGeom prst="rect">
-            <a:avLst/>
-          </a:prstGeom>
-        </p:spPr>
-      </p:pic>
       <p:sp>
         <p:nvSpPr>
           <p:cNvPr id="35" name="TextBox 34"/>
@@ -5645,8 +5630,8 @@
         </p:nvSpPr>
         <p:spPr>
           <a:xfrm>
-            <a:off x="9609972" y="1922577"/>
-            <a:ext cx="2395207" cy="738664"/>
+            <a:off x="9490573" y="1549783"/>
+            <a:ext cx="2808782" cy="1384995"/>
           </a:xfrm>
           <a:prstGeom prst="rect">
             <a:avLst/>
@@ -5660,8 +5645,53 @@
           <a:lstStyle/>
           <a:p>
             <a:r>
+              <a:rPr lang="ko-KR" altLang="en-US" sz="1400" dirty="0" err="1" smtClean="0"/>
+              <a:t>디폴트값</a:t>
+            </a:r>
+            <a:r>
               <a:rPr lang="ko-KR" altLang="en-US" sz="1400" dirty="0" smtClean="0"/>
-              <a:t>지도의 지역 </a:t>
+              <a:t> </a:t>
+            </a:r>
+            <a:r>
+              <a:rPr lang="en-US" altLang="ko-KR" sz="1400" dirty="0" smtClean="0"/>
+              <a:t>: </a:t>
+            </a:r>
+            <a:r>
+              <a:rPr lang="ko-KR" altLang="en-US" sz="1400" dirty="0" smtClean="0"/>
+              <a:t>현재의 월을 기준으로</a:t>
+            </a:r>
+            <a:endParaRPr lang="en-US" altLang="ko-KR" sz="1400" dirty="0" smtClean="0"/>
+          </a:p>
+          <a:p>
+            <a:r>
+              <a:rPr lang="ko-KR" altLang="en-US" sz="1400" dirty="0" err="1" smtClean="0"/>
+              <a:t>전체지역의</a:t>
+            </a:r>
+            <a:r>
+              <a:rPr lang="ko-KR" altLang="en-US" sz="1400" dirty="0" smtClean="0"/>
+              <a:t> 랜덤</a:t>
+            </a:r>
+            <a:r>
+              <a:rPr lang="en-US" altLang="ko-KR" sz="1400" dirty="0" smtClean="0"/>
+              <a:t>3</a:t>
+            </a:r>
+            <a:r>
+              <a:rPr lang="ko-KR" altLang="en-US" sz="1400" dirty="0" smtClean="0"/>
+              <a:t>개</a:t>
+            </a:r>
+            <a:endParaRPr lang="en-US" altLang="ko-KR" sz="1400" dirty="0" smtClean="0"/>
+          </a:p>
+          <a:p>
+            <a:endParaRPr lang="en-US" altLang="ko-KR" sz="1400" dirty="0" smtClean="0"/>
+          </a:p>
+          <a:p>
+            <a:r>
+              <a:rPr lang="ko-KR" altLang="en-US" sz="1400" dirty="0" smtClean="0"/>
+              <a:t>지도의 </a:t>
+            </a:r>
+            <a:r>
+              <a:rPr lang="ko-KR" altLang="en-US" sz="1400" dirty="0" smtClean="0"/>
+              <a:t>지역 </a:t>
             </a:r>
             <a:r>
               <a:rPr lang="ko-KR" altLang="en-US" sz="1400" dirty="0" err="1" smtClean="0"/>
@@ -5680,65 +5710,28 @@
             </a:r>
             <a:r>
               <a:rPr lang="ko-KR" altLang="en-US" sz="1400" dirty="0" smtClean="0"/>
-              <a:t>전체 축제 정보 페이지에 </a:t>
+              <a:t>오른쪽에 오늘을 기준으로</a:t>
             </a:r>
             <a:endParaRPr lang="en-US" altLang="ko-KR" sz="1400" dirty="0" smtClean="0"/>
           </a:p>
           <a:p>
             <a:r>
+              <a:rPr lang="en-US" altLang="ko-KR" sz="1400" dirty="0"/>
+              <a:t> </a:t>
+            </a:r>
+            <a:r>
+              <a:rPr lang="en-US" altLang="ko-KR" sz="1400" dirty="0" smtClean="0"/>
+              <a:t> </a:t>
+            </a:r>
+            <a:r>
+              <a:rPr lang="en-US" altLang="ko-KR" sz="1400" dirty="0" smtClean="0"/>
+              <a:t>3</a:t>
+            </a:r>
+            <a:r>
               <a:rPr lang="ko-KR" altLang="en-US" sz="1400" dirty="0" smtClean="0"/>
-              <a:t>   정렬되어 넘어감</a:t>
+              <a:t>개 표시</a:t>
             </a:r>
             <a:endParaRPr lang="ko-KR" altLang="en-US" sz="1400" dirty="0"/>
-          </a:p>
-        </p:txBody>
-      </p:sp>
-      <p:sp>
-        <p:nvSpPr>
-          <p:cNvPr id="60" name="사각형 설명선 59"/>
-          <p:cNvSpPr/>
-          <p:nvPr/>
-        </p:nvSpPr>
-        <p:spPr>
-          <a:xfrm>
-            <a:off x="3030610" y="4141818"/>
-            <a:ext cx="650869" cy="515569"/>
-          </a:xfrm>
-          <a:prstGeom prst="wedgeRectCallout">
-            <a:avLst>
-              <a:gd name="adj1" fmla="val 948934"/>
-              <a:gd name="adj2" fmla="val -438080"/>
-            </a:avLst>
-          </a:prstGeom>
-          <a:noFill/>
-          <a:ln w="38100">
-            <a:solidFill>
-              <a:srgbClr val="FF0000"/>
-            </a:solidFill>
-          </a:ln>
-        </p:spPr>
-        <p:style>
-          <a:lnRef idx="2">
-            <a:schemeClr val="accent1">
-              <a:shade val="50000"/>
-            </a:schemeClr>
-          </a:lnRef>
-          <a:fillRef idx="1">
-            <a:schemeClr val="accent1"/>
-          </a:fillRef>
-          <a:effectRef idx="0">
-            <a:schemeClr val="accent1"/>
-          </a:effectRef>
-          <a:fontRef idx="minor">
-            <a:schemeClr val="lt1"/>
-          </a:fontRef>
-        </p:style>
-        <p:txBody>
-          <a:bodyPr rtlCol="0" anchor="ctr"/>
-          <a:lstStyle/>
-          <a:p>
-            <a:pPr algn="ctr"/>
-            <a:endParaRPr lang="ko-KR" altLang="en-US" dirty="0"/>
           </a:p>
         </p:txBody>
       </p:sp>
@@ -5971,6 +5964,1898 @@
           <a:p>
             <a:pPr algn="ctr"/>
             <a:endParaRPr lang="ko-KR" altLang="en-US"/>
+          </a:p>
+        </p:txBody>
+      </p:sp>
+      <p:pic>
+        <p:nvPicPr>
+          <p:cNvPr id="2" name="그림 1"/>
+          <p:cNvPicPr>
+            <a:picLocks noChangeAspect="1"/>
+          </p:cNvPicPr>
+          <p:nvPr/>
+        </p:nvPicPr>
+        <p:blipFill>
+          <a:blip r:embed="rId2"/>
+          <a:stretch>
+            <a:fillRect/>
+          </a:stretch>
+        </p:blipFill>
+        <p:spPr>
+          <a:xfrm>
+            <a:off x="913507" y="1917738"/>
+            <a:ext cx="8488598" cy="3633496"/>
+          </a:xfrm>
+          <a:prstGeom prst="rect">
+            <a:avLst/>
+          </a:prstGeom>
+        </p:spPr>
+      </p:pic>
+      <p:sp>
+        <p:nvSpPr>
+          <p:cNvPr id="3" name="TextBox 2"/>
+          <p:cNvSpPr txBox="1"/>
+          <p:nvPr/>
+        </p:nvSpPr>
+        <p:spPr>
+          <a:xfrm>
+            <a:off x="1332162" y="1921992"/>
+            <a:ext cx="1449138" cy="1015663"/>
+          </a:xfrm>
+          <a:prstGeom prst="rect">
+            <a:avLst/>
+          </a:prstGeom>
+          <a:solidFill>
+            <a:schemeClr val="tx1"/>
+          </a:solidFill>
+          <a:ln>
+            <a:solidFill>
+              <a:schemeClr val="tx1"/>
+            </a:solidFill>
+          </a:ln>
+        </p:spPr>
+        <p:txBody>
+          <a:bodyPr wrap="square" rtlCol="0">
+            <a:spAutoFit/>
+          </a:bodyPr>
+          <a:lstStyle/>
+          <a:p>
+            <a:r>
+              <a:rPr lang="en-US" altLang="ko-KR" sz="6000" b="1" dirty="0" smtClean="0">
+                <a:solidFill>
+                  <a:schemeClr val="bg1"/>
+                </a:solidFill>
+              </a:rPr>
+              <a:t>6</a:t>
+            </a:r>
+            <a:r>
+              <a:rPr lang="ko-KR" altLang="en-US" sz="6000" b="1" dirty="0" smtClean="0">
+                <a:solidFill>
+                  <a:schemeClr val="bg1"/>
+                </a:solidFill>
+              </a:rPr>
+              <a:t>월</a:t>
+            </a:r>
+            <a:endParaRPr lang="ko-KR" altLang="en-US" sz="6000" b="1" dirty="0">
+              <a:solidFill>
+                <a:schemeClr val="bg1"/>
+              </a:solidFill>
+            </a:endParaRPr>
+          </a:p>
+        </p:txBody>
+      </p:sp>
+      <p:sp>
+        <p:nvSpPr>
+          <p:cNvPr id="6" name="오른쪽 화살표 5"/>
+          <p:cNvSpPr/>
+          <p:nvPr/>
+        </p:nvSpPr>
+        <p:spPr>
+          <a:xfrm>
+            <a:off x="2796922" y="2351899"/>
+            <a:ext cx="402566" cy="231418"/>
+          </a:xfrm>
+          <a:prstGeom prst="rightArrow">
+            <a:avLst/>
+          </a:prstGeom>
+        </p:spPr>
+        <p:style>
+          <a:lnRef idx="2">
+            <a:schemeClr val="accent1">
+              <a:shade val="50000"/>
+            </a:schemeClr>
+          </a:lnRef>
+          <a:fillRef idx="1">
+            <a:schemeClr val="accent1"/>
+          </a:fillRef>
+          <a:effectRef idx="0">
+            <a:schemeClr val="accent1"/>
+          </a:effectRef>
+          <a:fontRef idx="minor">
+            <a:schemeClr val="lt1"/>
+          </a:fontRef>
+        </p:style>
+        <p:txBody>
+          <a:bodyPr rtlCol="0" anchor="ctr"/>
+          <a:lstStyle/>
+          <a:p>
+            <a:pPr algn="ctr"/>
+            <a:endParaRPr lang="ko-KR" altLang="en-US"/>
+          </a:p>
+        </p:txBody>
+      </p:sp>
+      <p:sp>
+        <p:nvSpPr>
+          <p:cNvPr id="7" name="왼쪽 화살표 6"/>
+          <p:cNvSpPr/>
+          <p:nvPr/>
+        </p:nvSpPr>
+        <p:spPr>
+          <a:xfrm>
+            <a:off x="913507" y="2329809"/>
+            <a:ext cx="410610" cy="253508"/>
+          </a:xfrm>
+          <a:prstGeom prst="leftArrow">
+            <a:avLst/>
+          </a:prstGeom>
+        </p:spPr>
+        <p:style>
+          <a:lnRef idx="2">
+            <a:schemeClr val="accent1">
+              <a:shade val="50000"/>
+            </a:schemeClr>
+          </a:lnRef>
+          <a:fillRef idx="1">
+            <a:schemeClr val="accent1"/>
+          </a:fillRef>
+          <a:effectRef idx="0">
+            <a:schemeClr val="accent1"/>
+          </a:effectRef>
+          <a:fontRef idx="minor">
+            <a:schemeClr val="lt1"/>
+          </a:fontRef>
+        </p:style>
+        <p:txBody>
+          <a:bodyPr rtlCol="0" anchor="ctr"/>
+          <a:lstStyle/>
+          <a:p>
+            <a:pPr algn="ctr"/>
+            <a:endParaRPr lang="ko-KR" altLang="en-US"/>
+          </a:p>
+        </p:txBody>
+      </p:sp>
+      <p:sp>
+        <p:nvSpPr>
+          <p:cNvPr id="11" name="자유형 10"/>
+          <p:cNvSpPr/>
+          <p:nvPr/>
+        </p:nvSpPr>
+        <p:spPr>
+          <a:xfrm>
+            <a:off x="2264826" y="4281488"/>
+            <a:ext cx="183099" cy="233362"/>
+          </a:xfrm>
+          <a:custGeom>
+            <a:avLst/>
+            <a:gdLst>
+              <a:gd name="connsiteX0" fmla="*/ 40224 w 183099"/>
+              <a:gd name="connsiteY0" fmla="*/ 61912 h 233362"/>
+              <a:gd name="connsiteX1" fmla="*/ 2124 w 183099"/>
+              <a:gd name="connsiteY1" fmla="*/ 66675 h 233362"/>
+              <a:gd name="connsiteX2" fmla="*/ 6887 w 183099"/>
+              <a:gd name="connsiteY2" fmla="*/ 90487 h 233362"/>
+              <a:gd name="connsiteX3" fmla="*/ 21174 w 183099"/>
+              <a:gd name="connsiteY3" fmla="*/ 119062 h 233362"/>
+              <a:gd name="connsiteX4" fmla="*/ 25937 w 183099"/>
+              <a:gd name="connsiteY4" fmla="*/ 133350 h 233362"/>
+              <a:gd name="connsiteX5" fmla="*/ 25937 w 183099"/>
+              <a:gd name="connsiteY5" fmla="*/ 228600 h 233362"/>
+              <a:gd name="connsiteX6" fmla="*/ 44987 w 183099"/>
+              <a:gd name="connsiteY6" fmla="*/ 233362 h 233362"/>
+              <a:gd name="connsiteX7" fmla="*/ 73562 w 183099"/>
+              <a:gd name="connsiteY7" fmla="*/ 228600 h 233362"/>
+              <a:gd name="connsiteX8" fmla="*/ 87849 w 183099"/>
+              <a:gd name="connsiteY8" fmla="*/ 223837 h 233362"/>
+              <a:gd name="connsiteX9" fmla="*/ 102137 w 183099"/>
+              <a:gd name="connsiteY9" fmla="*/ 190500 h 233362"/>
+              <a:gd name="connsiteX10" fmla="*/ 97374 w 183099"/>
+              <a:gd name="connsiteY10" fmla="*/ 176212 h 233362"/>
+              <a:gd name="connsiteX11" fmla="*/ 78324 w 183099"/>
+              <a:gd name="connsiteY11" fmla="*/ 171450 h 233362"/>
+              <a:gd name="connsiteX12" fmla="*/ 83087 w 183099"/>
+              <a:gd name="connsiteY12" fmla="*/ 157162 h 233362"/>
+              <a:gd name="connsiteX13" fmla="*/ 106899 w 183099"/>
+              <a:gd name="connsiteY13" fmla="*/ 152400 h 233362"/>
+              <a:gd name="connsiteX14" fmla="*/ 135474 w 183099"/>
+              <a:gd name="connsiteY14" fmla="*/ 142875 h 233362"/>
+              <a:gd name="connsiteX15" fmla="*/ 149762 w 183099"/>
+              <a:gd name="connsiteY15" fmla="*/ 114300 h 233362"/>
+              <a:gd name="connsiteX16" fmla="*/ 154524 w 183099"/>
+              <a:gd name="connsiteY16" fmla="*/ 100012 h 233362"/>
+              <a:gd name="connsiteX17" fmla="*/ 168812 w 183099"/>
+              <a:gd name="connsiteY17" fmla="*/ 95250 h 233362"/>
+              <a:gd name="connsiteX18" fmla="*/ 183099 w 183099"/>
+              <a:gd name="connsiteY18" fmla="*/ 66675 h 233362"/>
+              <a:gd name="connsiteX19" fmla="*/ 178337 w 183099"/>
+              <a:gd name="connsiteY19" fmla="*/ 52387 h 233362"/>
+              <a:gd name="connsiteX20" fmla="*/ 164049 w 183099"/>
+              <a:gd name="connsiteY20" fmla="*/ 4762 h 233362"/>
+              <a:gd name="connsiteX21" fmla="*/ 149762 w 183099"/>
+              <a:gd name="connsiteY21" fmla="*/ 0 h 233362"/>
+              <a:gd name="connsiteX22" fmla="*/ 78324 w 183099"/>
+              <a:gd name="connsiteY22" fmla="*/ 14287 h 233362"/>
+              <a:gd name="connsiteX23" fmla="*/ 64037 w 183099"/>
+              <a:gd name="connsiteY23" fmla="*/ 42862 h 233362"/>
+              <a:gd name="connsiteX24" fmla="*/ 40224 w 183099"/>
+              <a:gd name="connsiteY24" fmla="*/ 61912 h 233362"/>
+            </a:gdLst>
+            <a:ahLst/>
+            <a:cxnLst>
+              <a:cxn ang="0">
+                <a:pos x="connsiteX0" y="connsiteY0"/>
+              </a:cxn>
+              <a:cxn ang="0">
+                <a:pos x="connsiteX1" y="connsiteY1"/>
+              </a:cxn>
+              <a:cxn ang="0">
+                <a:pos x="connsiteX2" y="connsiteY2"/>
+              </a:cxn>
+              <a:cxn ang="0">
+                <a:pos x="connsiteX3" y="connsiteY3"/>
+              </a:cxn>
+              <a:cxn ang="0">
+                <a:pos x="connsiteX4" y="connsiteY4"/>
+              </a:cxn>
+              <a:cxn ang="0">
+                <a:pos x="connsiteX5" y="connsiteY5"/>
+              </a:cxn>
+              <a:cxn ang="0">
+                <a:pos x="connsiteX6" y="connsiteY6"/>
+              </a:cxn>
+              <a:cxn ang="0">
+                <a:pos x="connsiteX7" y="connsiteY7"/>
+              </a:cxn>
+              <a:cxn ang="0">
+                <a:pos x="connsiteX8" y="connsiteY8"/>
+              </a:cxn>
+              <a:cxn ang="0">
+                <a:pos x="connsiteX9" y="connsiteY9"/>
+              </a:cxn>
+              <a:cxn ang="0">
+                <a:pos x="connsiteX10" y="connsiteY10"/>
+              </a:cxn>
+              <a:cxn ang="0">
+                <a:pos x="connsiteX11" y="connsiteY11"/>
+              </a:cxn>
+              <a:cxn ang="0">
+                <a:pos x="connsiteX12" y="connsiteY12"/>
+              </a:cxn>
+              <a:cxn ang="0">
+                <a:pos x="connsiteX13" y="connsiteY13"/>
+              </a:cxn>
+              <a:cxn ang="0">
+                <a:pos x="connsiteX14" y="connsiteY14"/>
+              </a:cxn>
+              <a:cxn ang="0">
+                <a:pos x="connsiteX15" y="connsiteY15"/>
+              </a:cxn>
+              <a:cxn ang="0">
+                <a:pos x="connsiteX16" y="connsiteY16"/>
+              </a:cxn>
+              <a:cxn ang="0">
+                <a:pos x="connsiteX17" y="connsiteY17"/>
+              </a:cxn>
+              <a:cxn ang="0">
+                <a:pos x="connsiteX18" y="connsiteY18"/>
+              </a:cxn>
+              <a:cxn ang="0">
+                <a:pos x="connsiteX19" y="connsiteY19"/>
+              </a:cxn>
+              <a:cxn ang="0">
+                <a:pos x="connsiteX20" y="connsiteY20"/>
+              </a:cxn>
+              <a:cxn ang="0">
+                <a:pos x="connsiteX21" y="connsiteY21"/>
+              </a:cxn>
+              <a:cxn ang="0">
+                <a:pos x="connsiteX22" y="connsiteY22"/>
+              </a:cxn>
+              <a:cxn ang="0">
+                <a:pos x="connsiteX23" y="connsiteY23"/>
+              </a:cxn>
+              <a:cxn ang="0">
+                <a:pos x="connsiteX24" y="connsiteY24"/>
+              </a:cxn>
+            </a:cxnLst>
+            <a:rect l="l" t="t" r="r" b="b"/>
+            <a:pathLst>
+              <a:path w="183099" h="233362">
+                <a:moveTo>
+                  <a:pt x="40224" y="61912"/>
+                </a:moveTo>
+                <a:cubicBezTo>
+                  <a:pt x="29905" y="65881"/>
+                  <a:pt x="11842" y="58346"/>
+                  <a:pt x="2124" y="66675"/>
+                </a:cubicBezTo>
+                <a:cubicBezTo>
+                  <a:pt x="-4022" y="71943"/>
+                  <a:pt x="4924" y="82634"/>
+                  <a:pt x="6887" y="90487"/>
+                </a:cubicBezTo>
+                <a:cubicBezTo>
+                  <a:pt x="12873" y="114433"/>
+                  <a:pt x="9532" y="95778"/>
+                  <a:pt x="21174" y="119062"/>
+                </a:cubicBezTo>
+                <a:cubicBezTo>
+                  <a:pt x="23419" y="123552"/>
+                  <a:pt x="24349" y="128587"/>
+                  <a:pt x="25937" y="133350"/>
+                </a:cubicBezTo>
+                <a:cubicBezTo>
+                  <a:pt x="14531" y="167564"/>
+                  <a:pt x="10611" y="173427"/>
+                  <a:pt x="25937" y="228600"/>
+                </a:cubicBezTo>
+                <a:cubicBezTo>
+                  <a:pt x="27689" y="234907"/>
+                  <a:pt x="38637" y="231775"/>
+                  <a:pt x="44987" y="233362"/>
+                </a:cubicBezTo>
+                <a:cubicBezTo>
+                  <a:pt x="54512" y="231775"/>
+                  <a:pt x="64136" y="230695"/>
+                  <a:pt x="73562" y="228600"/>
+                </a:cubicBezTo>
+                <a:cubicBezTo>
+                  <a:pt x="78462" y="227511"/>
+                  <a:pt x="84299" y="227387"/>
+                  <a:pt x="87849" y="223837"/>
+                </a:cubicBezTo>
+                <a:cubicBezTo>
+                  <a:pt x="93733" y="217953"/>
+                  <a:pt x="99291" y="199038"/>
+                  <a:pt x="102137" y="190500"/>
+                </a:cubicBezTo>
+                <a:cubicBezTo>
+                  <a:pt x="100549" y="185737"/>
+                  <a:pt x="101294" y="179348"/>
+                  <a:pt x="97374" y="176212"/>
+                </a:cubicBezTo>
+                <a:cubicBezTo>
+                  <a:pt x="92263" y="172123"/>
+                  <a:pt x="82251" y="176686"/>
+                  <a:pt x="78324" y="171450"/>
+                </a:cubicBezTo>
+                <a:cubicBezTo>
+                  <a:pt x="75312" y="167434"/>
+                  <a:pt x="78910" y="159947"/>
+                  <a:pt x="83087" y="157162"/>
+                </a:cubicBezTo>
+                <a:cubicBezTo>
+                  <a:pt x="89822" y="152672"/>
+                  <a:pt x="99090" y="154530"/>
+                  <a:pt x="106899" y="152400"/>
+                </a:cubicBezTo>
+                <a:cubicBezTo>
+                  <a:pt x="116585" y="149758"/>
+                  <a:pt x="125949" y="146050"/>
+                  <a:pt x="135474" y="142875"/>
+                </a:cubicBezTo>
+                <a:cubicBezTo>
+                  <a:pt x="147449" y="106954"/>
+                  <a:pt x="131294" y="151237"/>
+                  <a:pt x="149762" y="114300"/>
+                </a:cubicBezTo>
+                <a:cubicBezTo>
+                  <a:pt x="152007" y="109810"/>
+                  <a:pt x="150974" y="103562"/>
+                  <a:pt x="154524" y="100012"/>
+                </a:cubicBezTo>
+                <a:cubicBezTo>
+                  <a:pt x="158074" y="96462"/>
+                  <a:pt x="164049" y="96837"/>
+                  <a:pt x="168812" y="95250"/>
+                </a:cubicBezTo>
+                <a:cubicBezTo>
+                  <a:pt x="173628" y="88026"/>
+                  <a:pt x="183099" y="76534"/>
+                  <a:pt x="183099" y="66675"/>
+                </a:cubicBezTo>
+                <a:cubicBezTo>
+                  <a:pt x="183099" y="61655"/>
+                  <a:pt x="179716" y="57214"/>
+                  <a:pt x="178337" y="52387"/>
+                </a:cubicBezTo>
+                <a:cubicBezTo>
+                  <a:pt x="175185" y="41356"/>
+                  <a:pt x="169436" y="12304"/>
+                  <a:pt x="164049" y="4762"/>
+                </a:cubicBezTo>
+                <a:cubicBezTo>
+                  <a:pt x="161131" y="677"/>
+                  <a:pt x="154524" y="1587"/>
+                  <a:pt x="149762" y="0"/>
+                </a:cubicBezTo>
+                <a:cubicBezTo>
+                  <a:pt x="137487" y="1116"/>
+                  <a:pt x="93954" y="-1343"/>
+                  <a:pt x="78324" y="14287"/>
+                </a:cubicBezTo>
+                <a:cubicBezTo>
+                  <a:pt x="61889" y="30722"/>
+                  <a:pt x="87592" y="28141"/>
+                  <a:pt x="64037" y="42862"/>
+                </a:cubicBezTo>
+                <a:cubicBezTo>
+                  <a:pt x="46387" y="53893"/>
+                  <a:pt x="50543" y="57943"/>
+                  <a:pt x="40224" y="61912"/>
+                </a:cubicBezTo>
+                <a:close/>
+              </a:path>
+            </a:pathLst>
+          </a:custGeom>
+          <a:solidFill>
+            <a:schemeClr val="bg1">
+              <a:lumMod val="75000"/>
+            </a:schemeClr>
+          </a:solidFill>
+          <a:ln>
+            <a:solidFill>
+              <a:schemeClr val="bg1">
+                <a:lumMod val="75000"/>
+              </a:schemeClr>
+            </a:solidFill>
+          </a:ln>
+        </p:spPr>
+        <p:style>
+          <a:lnRef idx="2">
+            <a:schemeClr val="accent1">
+              <a:shade val="50000"/>
+            </a:schemeClr>
+          </a:lnRef>
+          <a:fillRef idx="1">
+            <a:schemeClr val="accent1"/>
+          </a:fillRef>
+          <a:effectRef idx="0">
+            <a:schemeClr val="accent1"/>
+          </a:effectRef>
+          <a:fontRef idx="minor">
+            <a:schemeClr val="lt1"/>
+          </a:fontRef>
+        </p:style>
+        <p:txBody>
+          <a:bodyPr rtlCol="0" anchor="ctr"/>
+          <a:lstStyle/>
+          <a:p>
+            <a:pPr algn="ctr"/>
+            <a:endParaRPr lang="ko-KR" altLang="en-US"/>
+          </a:p>
+        </p:txBody>
+      </p:sp>
+      <p:sp>
+        <p:nvSpPr>
+          <p:cNvPr id="12" name="자유형 11"/>
+          <p:cNvSpPr/>
+          <p:nvPr/>
+        </p:nvSpPr>
+        <p:spPr>
+          <a:xfrm>
+            <a:off x="1532056" y="3183731"/>
+            <a:ext cx="504177" cy="661988"/>
+          </a:xfrm>
+          <a:custGeom>
+            <a:avLst/>
+            <a:gdLst>
+              <a:gd name="connsiteX0" fmla="*/ 77669 w 504177"/>
+              <a:gd name="connsiteY0" fmla="*/ 140494 h 661988"/>
+              <a:gd name="connsiteX1" fmla="*/ 63382 w 504177"/>
+              <a:gd name="connsiteY1" fmla="*/ 147638 h 661988"/>
+              <a:gd name="connsiteX2" fmla="*/ 61000 w 504177"/>
+              <a:gd name="connsiteY2" fmla="*/ 173832 h 661988"/>
+              <a:gd name="connsiteX3" fmla="*/ 58619 w 504177"/>
+              <a:gd name="connsiteY3" fmla="*/ 209550 h 661988"/>
+              <a:gd name="connsiteX4" fmla="*/ 53857 w 504177"/>
+              <a:gd name="connsiteY4" fmla="*/ 226219 h 661988"/>
+              <a:gd name="connsiteX5" fmla="*/ 20519 w 504177"/>
+              <a:gd name="connsiteY5" fmla="*/ 240507 h 661988"/>
+              <a:gd name="connsiteX6" fmla="*/ 13375 w 504177"/>
+              <a:gd name="connsiteY6" fmla="*/ 242888 h 661988"/>
+              <a:gd name="connsiteX7" fmla="*/ 8613 w 504177"/>
+              <a:gd name="connsiteY7" fmla="*/ 250032 h 661988"/>
+              <a:gd name="connsiteX8" fmla="*/ 6232 w 504177"/>
+              <a:gd name="connsiteY8" fmla="*/ 257175 h 661988"/>
+              <a:gd name="connsiteX9" fmla="*/ 1469 w 504177"/>
+              <a:gd name="connsiteY9" fmla="*/ 269082 h 661988"/>
+              <a:gd name="connsiteX10" fmla="*/ 13375 w 504177"/>
+              <a:gd name="connsiteY10" fmla="*/ 323850 h 661988"/>
+              <a:gd name="connsiteX11" fmla="*/ 20519 w 504177"/>
+              <a:gd name="connsiteY11" fmla="*/ 328613 h 661988"/>
+              <a:gd name="connsiteX12" fmla="*/ 25282 w 504177"/>
+              <a:gd name="connsiteY12" fmla="*/ 335757 h 661988"/>
+              <a:gd name="connsiteX13" fmla="*/ 30044 w 504177"/>
+              <a:gd name="connsiteY13" fmla="*/ 354807 h 661988"/>
+              <a:gd name="connsiteX14" fmla="*/ 34807 w 504177"/>
+              <a:gd name="connsiteY14" fmla="*/ 373857 h 661988"/>
+              <a:gd name="connsiteX15" fmla="*/ 44332 w 504177"/>
+              <a:gd name="connsiteY15" fmla="*/ 395288 h 661988"/>
+              <a:gd name="connsiteX16" fmla="*/ 53857 w 504177"/>
+              <a:gd name="connsiteY16" fmla="*/ 400050 h 661988"/>
+              <a:gd name="connsiteX17" fmla="*/ 61000 w 504177"/>
+              <a:gd name="connsiteY17" fmla="*/ 407194 h 661988"/>
+              <a:gd name="connsiteX18" fmla="*/ 63382 w 504177"/>
+              <a:gd name="connsiteY18" fmla="*/ 421482 h 661988"/>
+              <a:gd name="connsiteX19" fmla="*/ 65763 w 504177"/>
+              <a:gd name="connsiteY19" fmla="*/ 428625 h 661988"/>
+              <a:gd name="connsiteX20" fmla="*/ 68144 w 504177"/>
+              <a:gd name="connsiteY20" fmla="*/ 438150 h 661988"/>
+              <a:gd name="connsiteX21" fmla="*/ 82432 w 504177"/>
+              <a:gd name="connsiteY21" fmla="*/ 442913 h 661988"/>
+              <a:gd name="connsiteX22" fmla="*/ 89575 w 504177"/>
+              <a:gd name="connsiteY22" fmla="*/ 466725 h 661988"/>
+              <a:gd name="connsiteX23" fmla="*/ 94338 w 504177"/>
+              <a:gd name="connsiteY23" fmla="*/ 473869 h 661988"/>
+              <a:gd name="connsiteX24" fmla="*/ 87194 w 504177"/>
+              <a:gd name="connsiteY24" fmla="*/ 478632 h 661988"/>
+              <a:gd name="connsiteX25" fmla="*/ 72907 w 504177"/>
+              <a:gd name="connsiteY25" fmla="*/ 483394 h 661988"/>
+              <a:gd name="connsiteX26" fmla="*/ 68144 w 504177"/>
+              <a:gd name="connsiteY26" fmla="*/ 490538 h 661988"/>
+              <a:gd name="connsiteX27" fmla="*/ 63382 w 504177"/>
+              <a:gd name="connsiteY27" fmla="*/ 516732 h 661988"/>
+              <a:gd name="connsiteX28" fmla="*/ 72907 w 504177"/>
+              <a:gd name="connsiteY28" fmla="*/ 535782 h 661988"/>
+              <a:gd name="connsiteX29" fmla="*/ 75288 w 504177"/>
+              <a:gd name="connsiteY29" fmla="*/ 542925 h 661988"/>
+              <a:gd name="connsiteX30" fmla="*/ 80050 w 504177"/>
+              <a:gd name="connsiteY30" fmla="*/ 550069 h 661988"/>
+              <a:gd name="connsiteX31" fmla="*/ 82432 w 504177"/>
+              <a:gd name="connsiteY31" fmla="*/ 559594 h 661988"/>
+              <a:gd name="connsiteX32" fmla="*/ 84813 w 504177"/>
+              <a:gd name="connsiteY32" fmla="*/ 573882 h 661988"/>
+              <a:gd name="connsiteX33" fmla="*/ 103863 w 504177"/>
+              <a:gd name="connsiteY33" fmla="*/ 590550 h 661988"/>
+              <a:gd name="connsiteX34" fmla="*/ 125294 w 504177"/>
+              <a:gd name="connsiteY34" fmla="*/ 597694 h 661988"/>
+              <a:gd name="connsiteX35" fmla="*/ 132438 w 504177"/>
+              <a:gd name="connsiteY35" fmla="*/ 600075 h 661988"/>
+              <a:gd name="connsiteX36" fmla="*/ 130057 w 504177"/>
+              <a:gd name="connsiteY36" fmla="*/ 647700 h 661988"/>
+              <a:gd name="connsiteX37" fmla="*/ 132438 w 504177"/>
+              <a:gd name="connsiteY37" fmla="*/ 654844 h 661988"/>
+              <a:gd name="connsiteX38" fmla="*/ 146725 w 504177"/>
+              <a:gd name="connsiteY38" fmla="*/ 659607 h 661988"/>
+              <a:gd name="connsiteX39" fmla="*/ 153869 w 504177"/>
+              <a:gd name="connsiteY39" fmla="*/ 661988 h 661988"/>
+              <a:gd name="connsiteX40" fmla="*/ 239594 w 504177"/>
+              <a:gd name="connsiteY40" fmla="*/ 659607 h 661988"/>
+              <a:gd name="connsiteX41" fmla="*/ 246738 w 504177"/>
+              <a:gd name="connsiteY41" fmla="*/ 657225 h 661988"/>
+              <a:gd name="connsiteX42" fmla="*/ 253882 w 504177"/>
+              <a:gd name="connsiteY42" fmla="*/ 652463 h 661988"/>
+              <a:gd name="connsiteX43" fmla="*/ 280075 w 504177"/>
+              <a:gd name="connsiteY43" fmla="*/ 657225 h 661988"/>
+              <a:gd name="connsiteX44" fmla="*/ 287219 w 504177"/>
+              <a:gd name="connsiteY44" fmla="*/ 661988 h 661988"/>
+              <a:gd name="connsiteX45" fmla="*/ 320557 w 504177"/>
+              <a:gd name="connsiteY45" fmla="*/ 650082 h 661988"/>
+              <a:gd name="connsiteX46" fmla="*/ 334844 w 504177"/>
+              <a:gd name="connsiteY46" fmla="*/ 645319 h 661988"/>
+              <a:gd name="connsiteX47" fmla="*/ 341988 w 504177"/>
+              <a:gd name="connsiteY47" fmla="*/ 631032 h 661988"/>
+              <a:gd name="connsiteX48" fmla="*/ 353894 w 504177"/>
+              <a:gd name="connsiteY48" fmla="*/ 614363 h 661988"/>
+              <a:gd name="connsiteX49" fmla="*/ 361038 w 504177"/>
+              <a:gd name="connsiteY49" fmla="*/ 607219 h 661988"/>
+              <a:gd name="connsiteX50" fmla="*/ 365800 w 504177"/>
+              <a:gd name="connsiteY50" fmla="*/ 600075 h 661988"/>
+              <a:gd name="connsiteX51" fmla="*/ 377707 w 504177"/>
+              <a:gd name="connsiteY51" fmla="*/ 597694 h 661988"/>
+              <a:gd name="connsiteX52" fmla="*/ 399138 w 504177"/>
+              <a:gd name="connsiteY52" fmla="*/ 600075 h 661988"/>
+              <a:gd name="connsiteX53" fmla="*/ 470575 w 504177"/>
+              <a:gd name="connsiteY53" fmla="*/ 595313 h 661988"/>
+              <a:gd name="connsiteX54" fmla="*/ 472957 w 504177"/>
+              <a:gd name="connsiteY54" fmla="*/ 588169 h 661988"/>
+              <a:gd name="connsiteX55" fmla="*/ 480100 w 504177"/>
+              <a:gd name="connsiteY55" fmla="*/ 583407 h 661988"/>
+              <a:gd name="connsiteX56" fmla="*/ 487244 w 504177"/>
+              <a:gd name="connsiteY56" fmla="*/ 538163 h 661988"/>
+              <a:gd name="connsiteX57" fmla="*/ 492007 w 504177"/>
+              <a:gd name="connsiteY57" fmla="*/ 519113 h 661988"/>
+              <a:gd name="connsiteX58" fmla="*/ 494388 w 504177"/>
+              <a:gd name="connsiteY58" fmla="*/ 507207 h 661988"/>
+              <a:gd name="connsiteX59" fmla="*/ 496769 w 504177"/>
+              <a:gd name="connsiteY59" fmla="*/ 497682 h 661988"/>
+              <a:gd name="connsiteX60" fmla="*/ 501532 w 504177"/>
+              <a:gd name="connsiteY60" fmla="*/ 473869 h 661988"/>
+              <a:gd name="connsiteX61" fmla="*/ 501532 w 504177"/>
+              <a:gd name="connsiteY61" fmla="*/ 340519 h 661988"/>
+              <a:gd name="connsiteX62" fmla="*/ 487244 w 504177"/>
+              <a:gd name="connsiteY62" fmla="*/ 335757 h 661988"/>
+              <a:gd name="connsiteX63" fmla="*/ 477719 w 504177"/>
+              <a:gd name="connsiteY63" fmla="*/ 330994 h 661988"/>
+              <a:gd name="connsiteX64" fmla="*/ 470575 w 504177"/>
+              <a:gd name="connsiteY64" fmla="*/ 323850 h 661988"/>
+              <a:gd name="connsiteX65" fmla="*/ 456288 w 504177"/>
+              <a:gd name="connsiteY65" fmla="*/ 314325 h 661988"/>
+              <a:gd name="connsiteX66" fmla="*/ 449144 w 504177"/>
+              <a:gd name="connsiteY66" fmla="*/ 304800 h 661988"/>
+              <a:gd name="connsiteX67" fmla="*/ 434857 w 504177"/>
+              <a:gd name="connsiteY67" fmla="*/ 288132 h 661988"/>
+              <a:gd name="connsiteX68" fmla="*/ 430094 w 504177"/>
+              <a:gd name="connsiteY68" fmla="*/ 280988 h 661988"/>
+              <a:gd name="connsiteX69" fmla="*/ 418188 w 504177"/>
+              <a:gd name="connsiteY69" fmla="*/ 278607 h 661988"/>
+              <a:gd name="connsiteX70" fmla="*/ 408663 w 504177"/>
+              <a:gd name="connsiteY70" fmla="*/ 273844 h 661988"/>
+              <a:gd name="connsiteX71" fmla="*/ 403900 w 504177"/>
+              <a:gd name="connsiteY71" fmla="*/ 264319 h 661988"/>
+              <a:gd name="connsiteX72" fmla="*/ 399138 w 504177"/>
+              <a:gd name="connsiteY72" fmla="*/ 257175 h 661988"/>
+              <a:gd name="connsiteX73" fmla="*/ 401519 w 504177"/>
+              <a:gd name="connsiteY73" fmla="*/ 226219 h 661988"/>
+              <a:gd name="connsiteX74" fmla="*/ 408663 w 504177"/>
+              <a:gd name="connsiteY74" fmla="*/ 195263 h 661988"/>
+              <a:gd name="connsiteX75" fmla="*/ 411044 w 504177"/>
+              <a:gd name="connsiteY75" fmla="*/ 185738 h 661988"/>
+              <a:gd name="connsiteX76" fmla="*/ 415807 w 504177"/>
+              <a:gd name="connsiteY76" fmla="*/ 178594 h 661988"/>
+              <a:gd name="connsiteX77" fmla="*/ 420569 w 504177"/>
+              <a:gd name="connsiteY77" fmla="*/ 169069 h 661988"/>
+              <a:gd name="connsiteX78" fmla="*/ 427713 w 504177"/>
+              <a:gd name="connsiteY78" fmla="*/ 150019 h 661988"/>
+              <a:gd name="connsiteX79" fmla="*/ 425332 w 504177"/>
+              <a:gd name="connsiteY79" fmla="*/ 121444 h 661988"/>
+              <a:gd name="connsiteX80" fmla="*/ 418188 w 504177"/>
+              <a:gd name="connsiteY80" fmla="*/ 114300 h 661988"/>
+              <a:gd name="connsiteX81" fmla="*/ 372944 w 504177"/>
+              <a:gd name="connsiteY81" fmla="*/ 111919 h 661988"/>
+              <a:gd name="connsiteX82" fmla="*/ 363419 w 504177"/>
+              <a:gd name="connsiteY82" fmla="*/ 97632 h 661988"/>
+              <a:gd name="connsiteX83" fmla="*/ 358657 w 504177"/>
+              <a:gd name="connsiteY83" fmla="*/ 64294 h 661988"/>
+              <a:gd name="connsiteX84" fmla="*/ 353894 w 504177"/>
+              <a:gd name="connsiteY84" fmla="*/ 57150 h 661988"/>
+              <a:gd name="connsiteX85" fmla="*/ 346750 w 504177"/>
+              <a:gd name="connsiteY85" fmla="*/ 54769 h 661988"/>
+              <a:gd name="connsiteX86" fmla="*/ 339607 w 504177"/>
+              <a:gd name="connsiteY86" fmla="*/ 50007 h 661988"/>
+              <a:gd name="connsiteX87" fmla="*/ 332463 w 504177"/>
+              <a:gd name="connsiteY87" fmla="*/ 47625 h 661988"/>
+              <a:gd name="connsiteX88" fmla="*/ 280075 w 504177"/>
+              <a:gd name="connsiteY88" fmla="*/ 45244 h 661988"/>
+              <a:gd name="connsiteX89" fmla="*/ 263407 w 504177"/>
+              <a:gd name="connsiteY89" fmla="*/ 40482 h 661988"/>
+              <a:gd name="connsiteX90" fmla="*/ 256263 w 504177"/>
+              <a:gd name="connsiteY90" fmla="*/ 35719 h 661988"/>
+              <a:gd name="connsiteX91" fmla="*/ 237213 w 504177"/>
+              <a:gd name="connsiteY91" fmla="*/ 30957 h 661988"/>
+              <a:gd name="connsiteX92" fmla="*/ 232450 w 504177"/>
+              <a:gd name="connsiteY92" fmla="*/ 16669 h 661988"/>
+              <a:gd name="connsiteX93" fmla="*/ 230069 w 504177"/>
+              <a:gd name="connsiteY93" fmla="*/ 4763 h 661988"/>
+              <a:gd name="connsiteX94" fmla="*/ 222925 w 504177"/>
+              <a:gd name="connsiteY94" fmla="*/ 0 h 661988"/>
+              <a:gd name="connsiteX95" fmla="*/ 182444 w 504177"/>
+              <a:gd name="connsiteY95" fmla="*/ 2382 h 661988"/>
+              <a:gd name="connsiteX96" fmla="*/ 177682 w 504177"/>
+              <a:gd name="connsiteY96" fmla="*/ 9525 h 661988"/>
+              <a:gd name="connsiteX97" fmla="*/ 175300 w 504177"/>
+              <a:gd name="connsiteY97" fmla="*/ 26194 h 661988"/>
+              <a:gd name="connsiteX98" fmla="*/ 172919 w 504177"/>
+              <a:gd name="connsiteY98" fmla="*/ 35719 h 661988"/>
+              <a:gd name="connsiteX99" fmla="*/ 170538 w 504177"/>
+              <a:gd name="connsiteY99" fmla="*/ 50007 h 661988"/>
+              <a:gd name="connsiteX100" fmla="*/ 163394 w 504177"/>
+              <a:gd name="connsiteY100" fmla="*/ 66675 h 661988"/>
+              <a:gd name="connsiteX101" fmla="*/ 158632 w 504177"/>
+              <a:gd name="connsiteY101" fmla="*/ 73819 h 661988"/>
+              <a:gd name="connsiteX102" fmla="*/ 151488 w 504177"/>
+              <a:gd name="connsiteY102" fmla="*/ 80963 h 661988"/>
+              <a:gd name="connsiteX103" fmla="*/ 144344 w 504177"/>
+              <a:gd name="connsiteY103" fmla="*/ 90488 h 661988"/>
+              <a:gd name="connsiteX104" fmla="*/ 134819 w 504177"/>
+              <a:gd name="connsiteY104" fmla="*/ 95250 h 661988"/>
+              <a:gd name="connsiteX105" fmla="*/ 127675 w 504177"/>
+              <a:gd name="connsiteY105" fmla="*/ 100013 h 661988"/>
+              <a:gd name="connsiteX106" fmla="*/ 113388 w 504177"/>
+              <a:gd name="connsiteY106" fmla="*/ 109538 h 661988"/>
+              <a:gd name="connsiteX107" fmla="*/ 106244 w 504177"/>
+              <a:gd name="connsiteY107" fmla="*/ 116682 h 661988"/>
+              <a:gd name="connsiteX108" fmla="*/ 99100 w 504177"/>
+              <a:gd name="connsiteY108" fmla="*/ 121444 h 661988"/>
+              <a:gd name="connsiteX109" fmla="*/ 89575 w 504177"/>
+              <a:gd name="connsiteY109" fmla="*/ 138113 h 661988"/>
+              <a:gd name="connsiteX110" fmla="*/ 82432 w 504177"/>
+              <a:gd name="connsiteY110" fmla="*/ 152400 h 661988"/>
+              <a:gd name="connsiteX111" fmla="*/ 77669 w 504177"/>
+              <a:gd name="connsiteY111" fmla="*/ 140494 h 661988"/>
+            </a:gdLst>
+            <a:ahLst/>
+            <a:cxnLst>
+              <a:cxn ang="0">
+                <a:pos x="connsiteX0" y="connsiteY0"/>
+              </a:cxn>
+              <a:cxn ang="0">
+                <a:pos x="connsiteX1" y="connsiteY1"/>
+              </a:cxn>
+              <a:cxn ang="0">
+                <a:pos x="connsiteX2" y="connsiteY2"/>
+              </a:cxn>
+              <a:cxn ang="0">
+                <a:pos x="connsiteX3" y="connsiteY3"/>
+              </a:cxn>
+              <a:cxn ang="0">
+                <a:pos x="connsiteX4" y="connsiteY4"/>
+              </a:cxn>
+              <a:cxn ang="0">
+                <a:pos x="connsiteX5" y="connsiteY5"/>
+              </a:cxn>
+              <a:cxn ang="0">
+                <a:pos x="connsiteX6" y="connsiteY6"/>
+              </a:cxn>
+              <a:cxn ang="0">
+                <a:pos x="connsiteX7" y="connsiteY7"/>
+              </a:cxn>
+              <a:cxn ang="0">
+                <a:pos x="connsiteX8" y="connsiteY8"/>
+              </a:cxn>
+              <a:cxn ang="0">
+                <a:pos x="connsiteX9" y="connsiteY9"/>
+              </a:cxn>
+              <a:cxn ang="0">
+                <a:pos x="connsiteX10" y="connsiteY10"/>
+              </a:cxn>
+              <a:cxn ang="0">
+                <a:pos x="connsiteX11" y="connsiteY11"/>
+              </a:cxn>
+              <a:cxn ang="0">
+                <a:pos x="connsiteX12" y="connsiteY12"/>
+              </a:cxn>
+              <a:cxn ang="0">
+                <a:pos x="connsiteX13" y="connsiteY13"/>
+              </a:cxn>
+              <a:cxn ang="0">
+                <a:pos x="connsiteX14" y="connsiteY14"/>
+              </a:cxn>
+              <a:cxn ang="0">
+                <a:pos x="connsiteX15" y="connsiteY15"/>
+              </a:cxn>
+              <a:cxn ang="0">
+                <a:pos x="connsiteX16" y="connsiteY16"/>
+              </a:cxn>
+              <a:cxn ang="0">
+                <a:pos x="connsiteX17" y="connsiteY17"/>
+              </a:cxn>
+              <a:cxn ang="0">
+                <a:pos x="connsiteX18" y="connsiteY18"/>
+              </a:cxn>
+              <a:cxn ang="0">
+                <a:pos x="connsiteX19" y="connsiteY19"/>
+              </a:cxn>
+              <a:cxn ang="0">
+                <a:pos x="connsiteX20" y="connsiteY20"/>
+              </a:cxn>
+              <a:cxn ang="0">
+                <a:pos x="connsiteX21" y="connsiteY21"/>
+              </a:cxn>
+              <a:cxn ang="0">
+                <a:pos x="connsiteX22" y="connsiteY22"/>
+              </a:cxn>
+              <a:cxn ang="0">
+                <a:pos x="connsiteX23" y="connsiteY23"/>
+              </a:cxn>
+              <a:cxn ang="0">
+                <a:pos x="connsiteX24" y="connsiteY24"/>
+              </a:cxn>
+              <a:cxn ang="0">
+                <a:pos x="connsiteX25" y="connsiteY25"/>
+              </a:cxn>
+              <a:cxn ang="0">
+                <a:pos x="connsiteX26" y="connsiteY26"/>
+              </a:cxn>
+              <a:cxn ang="0">
+                <a:pos x="connsiteX27" y="connsiteY27"/>
+              </a:cxn>
+              <a:cxn ang="0">
+                <a:pos x="connsiteX28" y="connsiteY28"/>
+              </a:cxn>
+              <a:cxn ang="0">
+                <a:pos x="connsiteX29" y="connsiteY29"/>
+              </a:cxn>
+              <a:cxn ang="0">
+                <a:pos x="connsiteX30" y="connsiteY30"/>
+              </a:cxn>
+              <a:cxn ang="0">
+                <a:pos x="connsiteX31" y="connsiteY31"/>
+              </a:cxn>
+              <a:cxn ang="0">
+                <a:pos x="connsiteX32" y="connsiteY32"/>
+              </a:cxn>
+              <a:cxn ang="0">
+                <a:pos x="connsiteX33" y="connsiteY33"/>
+              </a:cxn>
+              <a:cxn ang="0">
+                <a:pos x="connsiteX34" y="connsiteY34"/>
+              </a:cxn>
+              <a:cxn ang="0">
+                <a:pos x="connsiteX35" y="connsiteY35"/>
+              </a:cxn>
+              <a:cxn ang="0">
+                <a:pos x="connsiteX36" y="connsiteY36"/>
+              </a:cxn>
+              <a:cxn ang="0">
+                <a:pos x="connsiteX37" y="connsiteY37"/>
+              </a:cxn>
+              <a:cxn ang="0">
+                <a:pos x="connsiteX38" y="connsiteY38"/>
+              </a:cxn>
+              <a:cxn ang="0">
+                <a:pos x="connsiteX39" y="connsiteY39"/>
+              </a:cxn>
+              <a:cxn ang="0">
+                <a:pos x="connsiteX40" y="connsiteY40"/>
+              </a:cxn>
+              <a:cxn ang="0">
+                <a:pos x="connsiteX41" y="connsiteY41"/>
+              </a:cxn>
+              <a:cxn ang="0">
+                <a:pos x="connsiteX42" y="connsiteY42"/>
+              </a:cxn>
+              <a:cxn ang="0">
+                <a:pos x="connsiteX43" y="connsiteY43"/>
+              </a:cxn>
+              <a:cxn ang="0">
+                <a:pos x="connsiteX44" y="connsiteY44"/>
+              </a:cxn>
+              <a:cxn ang="0">
+                <a:pos x="connsiteX45" y="connsiteY45"/>
+              </a:cxn>
+              <a:cxn ang="0">
+                <a:pos x="connsiteX46" y="connsiteY46"/>
+              </a:cxn>
+              <a:cxn ang="0">
+                <a:pos x="connsiteX47" y="connsiteY47"/>
+              </a:cxn>
+              <a:cxn ang="0">
+                <a:pos x="connsiteX48" y="connsiteY48"/>
+              </a:cxn>
+              <a:cxn ang="0">
+                <a:pos x="connsiteX49" y="connsiteY49"/>
+              </a:cxn>
+              <a:cxn ang="0">
+                <a:pos x="connsiteX50" y="connsiteY50"/>
+              </a:cxn>
+              <a:cxn ang="0">
+                <a:pos x="connsiteX51" y="connsiteY51"/>
+              </a:cxn>
+              <a:cxn ang="0">
+                <a:pos x="connsiteX52" y="connsiteY52"/>
+              </a:cxn>
+              <a:cxn ang="0">
+                <a:pos x="connsiteX53" y="connsiteY53"/>
+              </a:cxn>
+              <a:cxn ang="0">
+                <a:pos x="connsiteX54" y="connsiteY54"/>
+              </a:cxn>
+              <a:cxn ang="0">
+                <a:pos x="connsiteX55" y="connsiteY55"/>
+              </a:cxn>
+              <a:cxn ang="0">
+                <a:pos x="connsiteX56" y="connsiteY56"/>
+              </a:cxn>
+              <a:cxn ang="0">
+                <a:pos x="connsiteX57" y="connsiteY57"/>
+              </a:cxn>
+              <a:cxn ang="0">
+                <a:pos x="connsiteX58" y="connsiteY58"/>
+              </a:cxn>
+              <a:cxn ang="0">
+                <a:pos x="connsiteX59" y="connsiteY59"/>
+              </a:cxn>
+              <a:cxn ang="0">
+                <a:pos x="connsiteX60" y="connsiteY60"/>
+              </a:cxn>
+              <a:cxn ang="0">
+                <a:pos x="connsiteX61" y="connsiteY61"/>
+              </a:cxn>
+              <a:cxn ang="0">
+                <a:pos x="connsiteX62" y="connsiteY62"/>
+              </a:cxn>
+              <a:cxn ang="0">
+                <a:pos x="connsiteX63" y="connsiteY63"/>
+              </a:cxn>
+              <a:cxn ang="0">
+                <a:pos x="connsiteX64" y="connsiteY64"/>
+              </a:cxn>
+              <a:cxn ang="0">
+                <a:pos x="connsiteX65" y="connsiteY65"/>
+              </a:cxn>
+              <a:cxn ang="0">
+                <a:pos x="connsiteX66" y="connsiteY66"/>
+              </a:cxn>
+              <a:cxn ang="0">
+                <a:pos x="connsiteX67" y="connsiteY67"/>
+              </a:cxn>
+              <a:cxn ang="0">
+                <a:pos x="connsiteX68" y="connsiteY68"/>
+              </a:cxn>
+              <a:cxn ang="0">
+                <a:pos x="connsiteX69" y="connsiteY69"/>
+              </a:cxn>
+              <a:cxn ang="0">
+                <a:pos x="connsiteX70" y="connsiteY70"/>
+              </a:cxn>
+              <a:cxn ang="0">
+                <a:pos x="connsiteX71" y="connsiteY71"/>
+              </a:cxn>
+              <a:cxn ang="0">
+                <a:pos x="connsiteX72" y="connsiteY72"/>
+              </a:cxn>
+              <a:cxn ang="0">
+                <a:pos x="connsiteX73" y="connsiteY73"/>
+              </a:cxn>
+              <a:cxn ang="0">
+                <a:pos x="connsiteX74" y="connsiteY74"/>
+              </a:cxn>
+              <a:cxn ang="0">
+                <a:pos x="connsiteX75" y="connsiteY75"/>
+              </a:cxn>
+              <a:cxn ang="0">
+                <a:pos x="connsiteX76" y="connsiteY76"/>
+              </a:cxn>
+              <a:cxn ang="0">
+                <a:pos x="connsiteX77" y="connsiteY77"/>
+              </a:cxn>
+              <a:cxn ang="0">
+                <a:pos x="connsiteX78" y="connsiteY78"/>
+              </a:cxn>
+              <a:cxn ang="0">
+                <a:pos x="connsiteX79" y="connsiteY79"/>
+              </a:cxn>
+              <a:cxn ang="0">
+                <a:pos x="connsiteX80" y="connsiteY80"/>
+              </a:cxn>
+              <a:cxn ang="0">
+                <a:pos x="connsiteX81" y="connsiteY81"/>
+              </a:cxn>
+              <a:cxn ang="0">
+                <a:pos x="connsiteX82" y="connsiteY82"/>
+              </a:cxn>
+              <a:cxn ang="0">
+                <a:pos x="connsiteX83" y="connsiteY83"/>
+              </a:cxn>
+              <a:cxn ang="0">
+                <a:pos x="connsiteX84" y="connsiteY84"/>
+              </a:cxn>
+              <a:cxn ang="0">
+                <a:pos x="connsiteX85" y="connsiteY85"/>
+              </a:cxn>
+              <a:cxn ang="0">
+                <a:pos x="connsiteX86" y="connsiteY86"/>
+              </a:cxn>
+              <a:cxn ang="0">
+                <a:pos x="connsiteX87" y="connsiteY87"/>
+              </a:cxn>
+              <a:cxn ang="0">
+                <a:pos x="connsiteX88" y="connsiteY88"/>
+              </a:cxn>
+              <a:cxn ang="0">
+                <a:pos x="connsiteX89" y="connsiteY89"/>
+              </a:cxn>
+              <a:cxn ang="0">
+                <a:pos x="connsiteX90" y="connsiteY90"/>
+              </a:cxn>
+              <a:cxn ang="0">
+                <a:pos x="connsiteX91" y="connsiteY91"/>
+              </a:cxn>
+              <a:cxn ang="0">
+                <a:pos x="connsiteX92" y="connsiteY92"/>
+              </a:cxn>
+              <a:cxn ang="0">
+                <a:pos x="connsiteX93" y="connsiteY93"/>
+              </a:cxn>
+              <a:cxn ang="0">
+                <a:pos x="connsiteX94" y="connsiteY94"/>
+              </a:cxn>
+              <a:cxn ang="0">
+                <a:pos x="connsiteX95" y="connsiteY95"/>
+              </a:cxn>
+              <a:cxn ang="0">
+                <a:pos x="connsiteX96" y="connsiteY96"/>
+              </a:cxn>
+              <a:cxn ang="0">
+                <a:pos x="connsiteX97" y="connsiteY97"/>
+              </a:cxn>
+              <a:cxn ang="0">
+                <a:pos x="connsiteX98" y="connsiteY98"/>
+              </a:cxn>
+              <a:cxn ang="0">
+                <a:pos x="connsiteX99" y="connsiteY99"/>
+              </a:cxn>
+              <a:cxn ang="0">
+                <a:pos x="connsiteX100" y="connsiteY100"/>
+              </a:cxn>
+              <a:cxn ang="0">
+                <a:pos x="connsiteX101" y="connsiteY101"/>
+              </a:cxn>
+              <a:cxn ang="0">
+                <a:pos x="connsiteX102" y="connsiteY102"/>
+              </a:cxn>
+              <a:cxn ang="0">
+                <a:pos x="connsiteX103" y="connsiteY103"/>
+              </a:cxn>
+              <a:cxn ang="0">
+                <a:pos x="connsiteX104" y="connsiteY104"/>
+              </a:cxn>
+              <a:cxn ang="0">
+                <a:pos x="connsiteX105" y="connsiteY105"/>
+              </a:cxn>
+              <a:cxn ang="0">
+                <a:pos x="connsiteX106" y="connsiteY106"/>
+              </a:cxn>
+              <a:cxn ang="0">
+                <a:pos x="connsiteX107" y="connsiteY107"/>
+              </a:cxn>
+              <a:cxn ang="0">
+                <a:pos x="connsiteX108" y="connsiteY108"/>
+              </a:cxn>
+              <a:cxn ang="0">
+                <a:pos x="connsiteX109" y="connsiteY109"/>
+              </a:cxn>
+              <a:cxn ang="0">
+                <a:pos x="connsiteX110" y="connsiteY110"/>
+              </a:cxn>
+              <a:cxn ang="0">
+                <a:pos x="connsiteX111" y="connsiteY111"/>
+              </a:cxn>
+            </a:cxnLst>
+            <a:rect l="l" t="t" r="r" b="b"/>
+            <a:pathLst>
+              <a:path w="504177" h="661988">
+                <a:moveTo>
+                  <a:pt x="77669" y="140494"/>
+                </a:moveTo>
+                <a:cubicBezTo>
+                  <a:pt x="74494" y="139700"/>
+                  <a:pt x="67389" y="144132"/>
+                  <a:pt x="63382" y="147638"/>
+                </a:cubicBezTo>
+                <a:cubicBezTo>
+                  <a:pt x="55070" y="154911"/>
+                  <a:pt x="59759" y="165147"/>
+                  <a:pt x="61000" y="173832"/>
+                </a:cubicBezTo>
+                <a:cubicBezTo>
+                  <a:pt x="60206" y="185738"/>
+                  <a:pt x="59868" y="197683"/>
+                  <a:pt x="58619" y="209550"/>
+                </a:cubicBezTo>
+                <a:cubicBezTo>
+                  <a:pt x="58576" y="209956"/>
+                  <a:pt x="55012" y="224832"/>
+                  <a:pt x="53857" y="226219"/>
+                </a:cubicBezTo>
+                <a:cubicBezTo>
+                  <a:pt x="45714" y="235992"/>
+                  <a:pt x="31933" y="237246"/>
+                  <a:pt x="20519" y="240507"/>
+                </a:cubicBezTo>
+                <a:cubicBezTo>
+                  <a:pt x="18105" y="241197"/>
+                  <a:pt x="15756" y="242094"/>
+                  <a:pt x="13375" y="242888"/>
+                </a:cubicBezTo>
+                <a:cubicBezTo>
+                  <a:pt x="11788" y="245269"/>
+                  <a:pt x="9893" y="247472"/>
+                  <a:pt x="8613" y="250032"/>
+                </a:cubicBezTo>
+                <a:cubicBezTo>
+                  <a:pt x="7491" y="252277"/>
+                  <a:pt x="7113" y="254825"/>
+                  <a:pt x="6232" y="257175"/>
+                </a:cubicBezTo>
+                <a:cubicBezTo>
+                  <a:pt x="4731" y="261178"/>
+                  <a:pt x="3057" y="265113"/>
+                  <a:pt x="1469" y="269082"/>
+                </a:cubicBezTo>
+                <a:cubicBezTo>
+                  <a:pt x="3883" y="317376"/>
+                  <a:pt x="-8825" y="307993"/>
+                  <a:pt x="13375" y="323850"/>
+                </a:cubicBezTo>
+                <a:cubicBezTo>
+                  <a:pt x="15704" y="325514"/>
+                  <a:pt x="18138" y="327025"/>
+                  <a:pt x="20519" y="328613"/>
+                </a:cubicBezTo>
+                <a:cubicBezTo>
+                  <a:pt x="22107" y="330994"/>
+                  <a:pt x="24002" y="333197"/>
+                  <a:pt x="25282" y="335757"/>
+                </a:cubicBezTo>
+                <a:cubicBezTo>
+                  <a:pt x="27883" y="340960"/>
+                  <a:pt x="28879" y="349761"/>
+                  <a:pt x="30044" y="354807"/>
+                </a:cubicBezTo>
+                <a:cubicBezTo>
+                  <a:pt x="31516" y="361185"/>
+                  <a:pt x="32737" y="367647"/>
+                  <a:pt x="34807" y="373857"/>
+                </a:cubicBezTo>
+                <a:cubicBezTo>
+                  <a:pt x="36402" y="378641"/>
+                  <a:pt x="39106" y="390933"/>
+                  <a:pt x="44332" y="395288"/>
+                </a:cubicBezTo>
+                <a:cubicBezTo>
+                  <a:pt x="47059" y="397560"/>
+                  <a:pt x="50682" y="398463"/>
+                  <a:pt x="53857" y="400050"/>
+                </a:cubicBezTo>
+                <a:cubicBezTo>
+                  <a:pt x="56238" y="402431"/>
+                  <a:pt x="59632" y="404117"/>
+                  <a:pt x="61000" y="407194"/>
+                </a:cubicBezTo>
+                <a:cubicBezTo>
+                  <a:pt x="62961" y="411606"/>
+                  <a:pt x="62334" y="416769"/>
+                  <a:pt x="63382" y="421482"/>
+                </a:cubicBezTo>
+                <a:cubicBezTo>
+                  <a:pt x="63927" y="423932"/>
+                  <a:pt x="65074" y="426212"/>
+                  <a:pt x="65763" y="428625"/>
+                </a:cubicBezTo>
+                <a:cubicBezTo>
+                  <a:pt x="66662" y="431772"/>
+                  <a:pt x="65659" y="436020"/>
+                  <a:pt x="68144" y="438150"/>
+                </a:cubicBezTo>
+                <a:cubicBezTo>
+                  <a:pt x="71956" y="441417"/>
+                  <a:pt x="82432" y="442913"/>
+                  <a:pt x="82432" y="442913"/>
+                </a:cubicBezTo>
+                <a:cubicBezTo>
+                  <a:pt x="93149" y="458991"/>
+                  <a:pt x="81216" y="438862"/>
+                  <a:pt x="89575" y="466725"/>
+                </a:cubicBezTo>
+                <a:cubicBezTo>
+                  <a:pt x="90397" y="469466"/>
+                  <a:pt x="92750" y="471488"/>
+                  <a:pt x="94338" y="473869"/>
+                </a:cubicBezTo>
+                <a:cubicBezTo>
+                  <a:pt x="91957" y="475457"/>
+                  <a:pt x="89809" y="477470"/>
+                  <a:pt x="87194" y="478632"/>
+                </a:cubicBezTo>
+                <a:cubicBezTo>
+                  <a:pt x="82607" y="480671"/>
+                  <a:pt x="72907" y="483394"/>
+                  <a:pt x="72907" y="483394"/>
+                </a:cubicBezTo>
+                <a:cubicBezTo>
+                  <a:pt x="71319" y="485775"/>
+                  <a:pt x="69424" y="487978"/>
+                  <a:pt x="68144" y="490538"/>
+                </a:cubicBezTo>
+                <a:cubicBezTo>
+                  <a:pt x="64474" y="497878"/>
+                  <a:pt x="64202" y="510169"/>
+                  <a:pt x="63382" y="516732"/>
+                </a:cubicBezTo>
+                <a:cubicBezTo>
+                  <a:pt x="68141" y="540528"/>
+                  <a:pt x="61472" y="518630"/>
+                  <a:pt x="72907" y="535782"/>
+                </a:cubicBezTo>
+                <a:cubicBezTo>
+                  <a:pt x="74299" y="537870"/>
+                  <a:pt x="74166" y="540680"/>
+                  <a:pt x="75288" y="542925"/>
+                </a:cubicBezTo>
+                <a:cubicBezTo>
+                  <a:pt x="76568" y="545485"/>
+                  <a:pt x="78463" y="547688"/>
+                  <a:pt x="80050" y="550069"/>
+                </a:cubicBezTo>
+                <a:cubicBezTo>
+                  <a:pt x="80844" y="553244"/>
+                  <a:pt x="81790" y="556385"/>
+                  <a:pt x="82432" y="559594"/>
+                </a:cubicBezTo>
+                <a:cubicBezTo>
+                  <a:pt x="83379" y="564329"/>
+                  <a:pt x="83286" y="569301"/>
+                  <a:pt x="84813" y="573882"/>
+                </a:cubicBezTo>
+                <a:cubicBezTo>
+                  <a:pt x="87244" y="581175"/>
+                  <a:pt x="98208" y="588665"/>
+                  <a:pt x="103863" y="590550"/>
+                </a:cubicBezTo>
+                <a:lnTo>
+                  <a:pt x="125294" y="597694"/>
+                </a:lnTo>
+                <a:lnTo>
+                  <a:pt x="132438" y="600075"/>
+                </a:lnTo>
+                <a:cubicBezTo>
+                  <a:pt x="124742" y="623162"/>
+                  <a:pt x="126008" y="613284"/>
+                  <a:pt x="130057" y="647700"/>
+                </a:cubicBezTo>
+                <a:cubicBezTo>
+                  <a:pt x="130350" y="650193"/>
+                  <a:pt x="130396" y="653385"/>
+                  <a:pt x="132438" y="654844"/>
+                </a:cubicBezTo>
+                <a:cubicBezTo>
+                  <a:pt x="136523" y="657762"/>
+                  <a:pt x="141963" y="658019"/>
+                  <a:pt x="146725" y="659607"/>
+                </a:cubicBezTo>
+                <a:lnTo>
+                  <a:pt x="153869" y="661988"/>
+                </a:lnTo>
+                <a:cubicBezTo>
+                  <a:pt x="182444" y="661194"/>
+                  <a:pt x="211046" y="661071"/>
+                  <a:pt x="239594" y="659607"/>
+                </a:cubicBezTo>
+                <a:cubicBezTo>
+                  <a:pt x="242101" y="659478"/>
+                  <a:pt x="244493" y="658348"/>
+                  <a:pt x="246738" y="657225"/>
+                </a:cubicBezTo>
+                <a:cubicBezTo>
+                  <a:pt x="249298" y="655945"/>
+                  <a:pt x="251501" y="654050"/>
+                  <a:pt x="253882" y="652463"/>
+                </a:cubicBezTo>
+                <a:cubicBezTo>
+                  <a:pt x="260447" y="653283"/>
+                  <a:pt x="272734" y="653554"/>
+                  <a:pt x="280075" y="657225"/>
+                </a:cubicBezTo>
+                <a:cubicBezTo>
+                  <a:pt x="282635" y="658505"/>
+                  <a:pt x="284838" y="660400"/>
+                  <a:pt x="287219" y="661988"/>
+                </a:cubicBezTo>
+                <a:cubicBezTo>
+                  <a:pt x="313247" y="655482"/>
+                  <a:pt x="272261" y="666183"/>
+                  <a:pt x="320557" y="650082"/>
+                </a:cubicBezTo>
+                <a:lnTo>
+                  <a:pt x="334844" y="645319"/>
+                </a:lnTo>
+                <a:cubicBezTo>
+                  <a:pt x="348489" y="624853"/>
+                  <a:pt x="332134" y="650741"/>
+                  <a:pt x="341988" y="631032"/>
+                </a:cubicBezTo>
+                <a:cubicBezTo>
+                  <a:pt x="343497" y="628013"/>
+                  <a:pt x="352596" y="615877"/>
+                  <a:pt x="353894" y="614363"/>
+                </a:cubicBezTo>
+                <a:cubicBezTo>
+                  <a:pt x="356086" y="611806"/>
+                  <a:pt x="358882" y="609806"/>
+                  <a:pt x="361038" y="607219"/>
+                </a:cubicBezTo>
+                <a:cubicBezTo>
+                  <a:pt x="362870" y="605020"/>
+                  <a:pt x="363315" y="601495"/>
+                  <a:pt x="365800" y="600075"/>
+                </a:cubicBezTo>
+                <a:cubicBezTo>
+                  <a:pt x="369314" y="598067"/>
+                  <a:pt x="373738" y="598488"/>
+                  <a:pt x="377707" y="597694"/>
+                </a:cubicBezTo>
+                <a:cubicBezTo>
+                  <a:pt x="384851" y="598488"/>
+                  <a:pt x="391950" y="600075"/>
+                  <a:pt x="399138" y="600075"/>
+                </a:cubicBezTo>
+                <a:cubicBezTo>
+                  <a:pt x="431816" y="600075"/>
+                  <a:pt x="443114" y="598364"/>
+                  <a:pt x="470575" y="595313"/>
+                </a:cubicBezTo>
+                <a:cubicBezTo>
+                  <a:pt x="471369" y="592932"/>
+                  <a:pt x="471389" y="590129"/>
+                  <a:pt x="472957" y="588169"/>
+                </a:cubicBezTo>
+                <a:cubicBezTo>
+                  <a:pt x="474745" y="585934"/>
+                  <a:pt x="479073" y="586078"/>
+                  <a:pt x="480100" y="583407"/>
+                </a:cubicBezTo>
+                <a:cubicBezTo>
+                  <a:pt x="483473" y="574636"/>
+                  <a:pt x="485590" y="548915"/>
+                  <a:pt x="487244" y="538163"/>
+                </a:cubicBezTo>
+                <a:cubicBezTo>
+                  <a:pt x="490756" y="515335"/>
+                  <a:pt x="487949" y="535344"/>
+                  <a:pt x="492007" y="519113"/>
+                </a:cubicBezTo>
+                <a:cubicBezTo>
+                  <a:pt x="492989" y="515187"/>
+                  <a:pt x="493510" y="511158"/>
+                  <a:pt x="494388" y="507207"/>
+                </a:cubicBezTo>
+                <a:cubicBezTo>
+                  <a:pt x="495098" y="504012"/>
+                  <a:pt x="496127" y="500891"/>
+                  <a:pt x="496769" y="497682"/>
+                </a:cubicBezTo>
+                <a:cubicBezTo>
+                  <a:pt x="502602" y="468513"/>
+                  <a:pt x="496003" y="495977"/>
+                  <a:pt x="501532" y="473869"/>
+                </a:cubicBezTo>
+                <a:cubicBezTo>
+                  <a:pt x="502375" y="450270"/>
+                  <a:pt x="507039" y="364118"/>
+                  <a:pt x="501532" y="340519"/>
+                </a:cubicBezTo>
+                <a:cubicBezTo>
+                  <a:pt x="500391" y="335630"/>
+                  <a:pt x="491734" y="338002"/>
+                  <a:pt x="487244" y="335757"/>
+                </a:cubicBezTo>
+                <a:cubicBezTo>
+                  <a:pt x="484069" y="334169"/>
+                  <a:pt x="480608" y="333057"/>
+                  <a:pt x="477719" y="330994"/>
+                </a:cubicBezTo>
+                <a:cubicBezTo>
+                  <a:pt x="474979" y="329036"/>
+                  <a:pt x="473233" y="325918"/>
+                  <a:pt x="470575" y="323850"/>
+                </a:cubicBezTo>
+                <a:cubicBezTo>
+                  <a:pt x="466057" y="320336"/>
+                  <a:pt x="459722" y="318904"/>
+                  <a:pt x="456288" y="314325"/>
+                </a:cubicBezTo>
+                <a:cubicBezTo>
+                  <a:pt x="453907" y="311150"/>
+                  <a:pt x="451727" y="307813"/>
+                  <a:pt x="449144" y="304800"/>
+                </a:cubicBezTo>
+                <a:cubicBezTo>
+                  <a:pt x="434306" y="287490"/>
+                  <a:pt x="449781" y="309026"/>
+                  <a:pt x="434857" y="288132"/>
+                </a:cubicBezTo>
+                <a:cubicBezTo>
+                  <a:pt x="433193" y="285803"/>
+                  <a:pt x="432579" y="282408"/>
+                  <a:pt x="430094" y="280988"/>
+                </a:cubicBezTo>
+                <a:cubicBezTo>
+                  <a:pt x="426580" y="278980"/>
+                  <a:pt x="422157" y="279401"/>
+                  <a:pt x="418188" y="278607"/>
+                </a:cubicBezTo>
+                <a:cubicBezTo>
+                  <a:pt x="415013" y="277019"/>
+                  <a:pt x="411173" y="276354"/>
+                  <a:pt x="408663" y="273844"/>
+                </a:cubicBezTo>
+                <a:cubicBezTo>
+                  <a:pt x="406153" y="271334"/>
+                  <a:pt x="405661" y="267401"/>
+                  <a:pt x="403900" y="264319"/>
+                </a:cubicBezTo>
+                <a:cubicBezTo>
+                  <a:pt x="402480" y="261834"/>
+                  <a:pt x="400725" y="259556"/>
+                  <a:pt x="399138" y="257175"/>
+                </a:cubicBezTo>
+                <a:cubicBezTo>
+                  <a:pt x="399932" y="246856"/>
+                  <a:pt x="400623" y="236529"/>
+                  <a:pt x="401519" y="226219"/>
+                </a:cubicBezTo>
+                <a:cubicBezTo>
+                  <a:pt x="403785" y="200159"/>
+                  <a:pt x="399618" y="208829"/>
+                  <a:pt x="408663" y="195263"/>
+                </a:cubicBezTo>
+                <a:cubicBezTo>
+                  <a:pt x="409457" y="192088"/>
+                  <a:pt x="409755" y="188746"/>
+                  <a:pt x="411044" y="185738"/>
+                </a:cubicBezTo>
+                <a:cubicBezTo>
+                  <a:pt x="412171" y="183107"/>
+                  <a:pt x="414387" y="181079"/>
+                  <a:pt x="415807" y="178594"/>
+                </a:cubicBezTo>
+                <a:cubicBezTo>
+                  <a:pt x="417568" y="175512"/>
+                  <a:pt x="419323" y="172393"/>
+                  <a:pt x="420569" y="169069"/>
+                </a:cubicBezTo>
+                <a:cubicBezTo>
+                  <a:pt x="430291" y="143142"/>
+                  <a:pt x="414458" y="176526"/>
+                  <a:pt x="427713" y="150019"/>
+                </a:cubicBezTo>
+                <a:cubicBezTo>
+                  <a:pt x="426919" y="140494"/>
+                  <a:pt x="427795" y="130679"/>
+                  <a:pt x="425332" y="121444"/>
+                </a:cubicBezTo>
+                <a:cubicBezTo>
+                  <a:pt x="424464" y="118190"/>
+                  <a:pt x="421501" y="114902"/>
+                  <a:pt x="418188" y="114300"/>
+                </a:cubicBezTo>
+                <a:cubicBezTo>
+                  <a:pt x="403329" y="111598"/>
+                  <a:pt x="388025" y="112713"/>
+                  <a:pt x="372944" y="111919"/>
+                </a:cubicBezTo>
+                <a:cubicBezTo>
+                  <a:pt x="369769" y="107157"/>
+                  <a:pt x="363937" y="103332"/>
+                  <a:pt x="363419" y="97632"/>
+                </a:cubicBezTo>
+                <a:cubicBezTo>
+                  <a:pt x="362811" y="90945"/>
+                  <a:pt x="363237" y="73455"/>
+                  <a:pt x="358657" y="64294"/>
+                </a:cubicBezTo>
+                <a:cubicBezTo>
+                  <a:pt x="357377" y="61734"/>
+                  <a:pt x="356129" y="58938"/>
+                  <a:pt x="353894" y="57150"/>
+                </a:cubicBezTo>
+                <a:cubicBezTo>
+                  <a:pt x="351934" y="55582"/>
+                  <a:pt x="349131" y="55563"/>
+                  <a:pt x="346750" y="54769"/>
+                </a:cubicBezTo>
+                <a:cubicBezTo>
+                  <a:pt x="344369" y="53182"/>
+                  <a:pt x="342166" y="51287"/>
+                  <a:pt x="339607" y="50007"/>
+                </a:cubicBezTo>
+                <a:cubicBezTo>
+                  <a:pt x="337362" y="48884"/>
+                  <a:pt x="334965" y="47825"/>
+                  <a:pt x="332463" y="47625"/>
+                </a:cubicBezTo>
+                <a:cubicBezTo>
+                  <a:pt x="315038" y="46231"/>
+                  <a:pt x="297538" y="46038"/>
+                  <a:pt x="280075" y="45244"/>
+                </a:cubicBezTo>
+                <a:cubicBezTo>
+                  <a:pt x="277023" y="44481"/>
+                  <a:pt x="266823" y="42190"/>
+                  <a:pt x="263407" y="40482"/>
+                </a:cubicBezTo>
+                <a:cubicBezTo>
+                  <a:pt x="260847" y="39202"/>
+                  <a:pt x="258953" y="36697"/>
+                  <a:pt x="256263" y="35719"/>
+                </a:cubicBezTo>
+                <a:cubicBezTo>
+                  <a:pt x="250112" y="33482"/>
+                  <a:pt x="237213" y="30957"/>
+                  <a:pt x="237213" y="30957"/>
+                </a:cubicBezTo>
+                <a:cubicBezTo>
+                  <a:pt x="235625" y="26194"/>
+                  <a:pt x="233434" y="21592"/>
+                  <a:pt x="232450" y="16669"/>
+                </a:cubicBezTo>
+                <a:cubicBezTo>
+                  <a:pt x="231656" y="12700"/>
+                  <a:pt x="232077" y="8277"/>
+                  <a:pt x="230069" y="4763"/>
+                </a:cubicBezTo>
+                <a:cubicBezTo>
+                  <a:pt x="228649" y="2278"/>
+                  <a:pt x="225306" y="1588"/>
+                  <a:pt x="222925" y="0"/>
+                </a:cubicBezTo>
+                <a:cubicBezTo>
+                  <a:pt x="209431" y="794"/>
+                  <a:pt x="195671" y="-403"/>
+                  <a:pt x="182444" y="2382"/>
+                </a:cubicBezTo>
+                <a:cubicBezTo>
+                  <a:pt x="179644" y="2972"/>
+                  <a:pt x="178504" y="6784"/>
+                  <a:pt x="177682" y="9525"/>
+                </a:cubicBezTo>
+                <a:cubicBezTo>
+                  <a:pt x="176069" y="14901"/>
+                  <a:pt x="176304" y="20672"/>
+                  <a:pt x="175300" y="26194"/>
+                </a:cubicBezTo>
+                <a:cubicBezTo>
+                  <a:pt x="174715" y="29414"/>
+                  <a:pt x="173561" y="32510"/>
+                  <a:pt x="172919" y="35719"/>
+                </a:cubicBezTo>
+                <a:cubicBezTo>
+                  <a:pt x="171972" y="40454"/>
+                  <a:pt x="171585" y="45294"/>
+                  <a:pt x="170538" y="50007"/>
+                </a:cubicBezTo>
+                <a:cubicBezTo>
+                  <a:pt x="169324" y="55472"/>
+                  <a:pt x="166042" y="62041"/>
+                  <a:pt x="163394" y="66675"/>
+                </a:cubicBezTo>
+                <a:cubicBezTo>
+                  <a:pt x="161974" y="69160"/>
+                  <a:pt x="160464" y="71620"/>
+                  <a:pt x="158632" y="73819"/>
+                </a:cubicBezTo>
+                <a:cubicBezTo>
+                  <a:pt x="156476" y="76406"/>
+                  <a:pt x="153680" y="78406"/>
+                  <a:pt x="151488" y="80963"/>
+                </a:cubicBezTo>
+                <a:cubicBezTo>
+                  <a:pt x="148905" y="83976"/>
+                  <a:pt x="147357" y="87905"/>
+                  <a:pt x="144344" y="90488"/>
+                </a:cubicBezTo>
+                <a:cubicBezTo>
+                  <a:pt x="141649" y="92798"/>
+                  <a:pt x="137901" y="93489"/>
+                  <a:pt x="134819" y="95250"/>
+                </a:cubicBezTo>
+                <a:cubicBezTo>
+                  <a:pt x="132334" y="96670"/>
+                  <a:pt x="129874" y="98181"/>
+                  <a:pt x="127675" y="100013"/>
+                </a:cubicBezTo>
+                <a:cubicBezTo>
+                  <a:pt x="115784" y="109923"/>
+                  <a:pt x="125943" y="105354"/>
+                  <a:pt x="113388" y="109538"/>
+                </a:cubicBezTo>
+                <a:cubicBezTo>
+                  <a:pt x="111007" y="111919"/>
+                  <a:pt x="108831" y="114526"/>
+                  <a:pt x="106244" y="116682"/>
+                </a:cubicBezTo>
+                <a:cubicBezTo>
+                  <a:pt x="104045" y="118514"/>
+                  <a:pt x="101124" y="119420"/>
+                  <a:pt x="99100" y="121444"/>
+                </a:cubicBezTo>
+                <a:cubicBezTo>
+                  <a:pt x="96113" y="124431"/>
+                  <a:pt x="90974" y="134848"/>
+                  <a:pt x="89575" y="138113"/>
+                </a:cubicBezTo>
+                <a:cubicBezTo>
+                  <a:pt x="87100" y="143888"/>
+                  <a:pt x="87662" y="147824"/>
+                  <a:pt x="82432" y="152400"/>
+                </a:cubicBezTo>
+                <a:cubicBezTo>
+                  <a:pt x="71043" y="162365"/>
+                  <a:pt x="80844" y="141288"/>
+                  <a:pt x="77669" y="140494"/>
+                </a:cubicBezTo>
+                <a:close/>
+              </a:path>
+            </a:pathLst>
+          </a:custGeom>
+          <a:solidFill>
+            <a:schemeClr val="bg2">
+              <a:lumMod val="90000"/>
+            </a:schemeClr>
+          </a:solidFill>
+          <a:ln>
+            <a:solidFill>
+              <a:schemeClr val="bg2">
+                <a:lumMod val="90000"/>
+              </a:schemeClr>
+            </a:solidFill>
+          </a:ln>
+        </p:spPr>
+        <p:style>
+          <a:lnRef idx="2">
+            <a:schemeClr val="accent1">
+              <a:shade val="50000"/>
+            </a:schemeClr>
+          </a:lnRef>
+          <a:fillRef idx="1">
+            <a:schemeClr val="accent1"/>
+          </a:fillRef>
+          <a:effectRef idx="0">
+            <a:schemeClr val="accent1"/>
+          </a:effectRef>
+          <a:fontRef idx="minor">
+            <a:schemeClr val="lt1"/>
+          </a:fontRef>
+        </p:style>
+        <p:txBody>
+          <a:bodyPr rtlCol="0" anchor="ctr"/>
+          <a:lstStyle/>
+          <a:p>
+            <a:pPr algn="ctr"/>
+            <a:endParaRPr lang="ko-KR" altLang="en-US"/>
+          </a:p>
+        </p:txBody>
+      </p:sp>
+      <p:sp>
+        <p:nvSpPr>
+          <p:cNvPr id="13" name="TextBox 12"/>
+          <p:cNvSpPr txBox="1"/>
+          <p:nvPr/>
+        </p:nvSpPr>
+        <p:spPr>
+          <a:xfrm>
+            <a:off x="3608170" y="1937550"/>
+            <a:ext cx="772969" cy="369332"/>
+          </a:xfrm>
+          <a:prstGeom prst="rect">
+            <a:avLst/>
+          </a:prstGeom>
+          <a:noFill/>
+        </p:spPr>
+        <p:txBody>
+          <a:bodyPr wrap="none" rtlCol="0">
+            <a:spAutoFit/>
+          </a:bodyPr>
+          <a:lstStyle/>
+          <a:p>
+            <a:r>
+              <a:rPr lang="en-US" altLang="ko-KR" b="1" smtClean="0"/>
+              <a:t>6</a:t>
+            </a:r>
+            <a:r>
+              <a:rPr lang="ko-KR" altLang="en-US" b="1" dirty="0" smtClean="0"/>
+              <a:t>월의</a:t>
+            </a:r>
+            <a:endParaRPr lang="ko-KR" altLang="en-US" b="1" dirty="0"/>
+          </a:p>
+        </p:txBody>
+      </p:sp>
+      <p:sp>
+        <p:nvSpPr>
+          <p:cNvPr id="60" name="사각형 설명선 59"/>
+          <p:cNvSpPr/>
+          <p:nvPr/>
+        </p:nvSpPr>
+        <p:spPr>
+          <a:xfrm>
+            <a:off x="1939391" y="3040022"/>
+            <a:ext cx="650869" cy="515569"/>
+          </a:xfrm>
+          <a:prstGeom prst="wedgeRectCallout">
+            <a:avLst>
+              <a:gd name="adj1" fmla="val 1098363"/>
+              <a:gd name="adj2" fmla="val -230088"/>
+            </a:avLst>
+          </a:prstGeom>
+          <a:noFill/>
+          <a:ln w="38100">
+            <a:solidFill>
+              <a:srgbClr val="FF0000"/>
+            </a:solidFill>
+          </a:ln>
+        </p:spPr>
+        <p:style>
+          <a:lnRef idx="2">
+            <a:schemeClr val="accent1">
+              <a:shade val="50000"/>
+            </a:schemeClr>
+          </a:lnRef>
+          <a:fillRef idx="1">
+            <a:schemeClr val="accent1"/>
+          </a:fillRef>
+          <a:effectRef idx="0">
+            <a:schemeClr val="accent1"/>
+          </a:effectRef>
+          <a:fontRef idx="minor">
+            <a:schemeClr val="lt1"/>
+          </a:fontRef>
+        </p:style>
+        <p:txBody>
+          <a:bodyPr rtlCol="0" anchor="ctr"/>
+          <a:lstStyle/>
+          <a:p>
+            <a:pPr algn="ctr"/>
+            <a:endParaRPr lang="ko-KR" altLang="en-US" dirty="0"/>
+          </a:p>
+        </p:txBody>
+      </p:sp>
+      <p:sp>
+        <p:nvSpPr>
+          <p:cNvPr id="15" name="모서리가 둥근 직사각형 14"/>
+          <p:cNvSpPr/>
+          <p:nvPr/>
+        </p:nvSpPr>
+        <p:spPr>
+          <a:xfrm>
+            <a:off x="2268312" y="5134838"/>
+            <a:ext cx="826870" cy="290128"/>
+          </a:xfrm>
+          <a:prstGeom prst="roundRect">
+            <a:avLst/>
+          </a:prstGeom>
+          <a:solidFill>
+            <a:schemeClr val="bg2"/>
+          </a:solidFill>
+          <a:ln>
+            <a:solidFill>
+              <a:schemeClr val="bg2"/>
+            </a:solidFill>
+          </a:ln>
+        </p:spPr>
+        <p:style>
+          <a:lnRef idx="2">
+            <a:schemeClr val="accent1">
+              <a:shade val="50000"/>
+            </a:schemeClr>
+          </a:lnRef>
+          <a:fillRef idx="1">
+            <a:schemeClr val="accent1"/>
+          </a:fillRef>
+          <a:effectRef idx="0">
+            <a:schemeClr val="accent1"/>
+          </a:effectRef>
+          <a:fontRef idx="minor">
+            <a:schemeClr val="lt1"/>
+          </a:fontRef>
+        </p:style>
+        <p:txBody>
+          <a:bodyPr rtlCol="0" anchor="ctr"/>
+          <a:lstStyle/>
+          <a:p>
+            <a:pPr algn="ctr"/>
+            <a:r>
+              <a:rPr lang="ko-KR" altLang="en-US" sz="900" dirty="0" err="1" smtClean="0">
+                <a:solidFill>
+                  <a:schemeClr val="tx1"/>
+                </a:solidFill>
+              </a:rPr>
+              <a:t>전지역보기</a:t>
+            </a:r>
+            <a:endParaRPr lang="ko-KR" altLang="en-US" sz="900" dirty="0">
+              <a:solidFill>
+                <a:schemeClr val="tx1"/>
+              </a:solidFill>
+            </a:endParaRPr>
+          </a:p>
+        </p:txBody>
+      </p:sp>
+      <p:sp>
+        <p:nvSpPr>
+          <p:cNvPr id="19" name="직사각형 18"/>
+          <p:cNvSpPr/>
+          <p:nvPr/>
+        </p:nvSpPr>
+        <p:spPr>
+          <a:xfrm>
+            <a:off x="3531554" y="5222642"/>
+            <a:ext cx="5411108" cy="538078"/>
+          </a:xfrm>
+          <a:prstGeom prst="rect">
+            <a:avLst/>
+          </a:prstGeom>
+          <a:solidFill>
+            <a:schemeClr val="bg1"/>
+          </a:solidFill>
+          <a:ln>
+            <a:solidFill>
+              <a:schemeClr val="bg1"/>
+            </a:solidFill>
+          </a:ln>
+        </p:spPr>
+        <p:style>
+          <a:lnRef idx="2">
+            <a:schemeClr val="accent1">
+              <a:shade val="50000"/>
+            </a:schemeClr>
+          </a:lnRef>
+          <a:fillRef idx="1">
+            <a:schemeClr val="accent1"/>
+          </a:fillRef>
+          <a:effectRef idx="0">
+            <a:schemeClr val="accent1"/>
+          </a:effectRef>
+          <a:fontRef idx="minor">
+            <a:schemeClr val="lt1"/>
+          </a:fontRef>
+        </p:style>
+        <p:txBody>
+          <a:bodyPr rtlCol="0" anchor="ctr"/>
+          <a:lstStyle/>
+          <a:p>
+            <a:pPr algn="ctr"/>
+            <a:endParaRPr lang="ko-KR" altLang="en-US"/>
+          </a:p>
+        </p:txBody>
+      </p:sp>
+      <p:sp>
+        <p:nvSpPr>
+          <p:cNvPr id="41" name="모서리가 둥근 직사각형 40"/>
+          <p:cNvSpPr/>
+          <p:nvPr/>
+        </p:nvSpPr>
+        <p:spPr>
+          <a:xfrm>
+            <a:off x="8171329" y="5261106"/>
+            <a:ext cx="831273" cy="290128"/>
+          </a:xfrm>
+          <a:prstGeom prst="roundRect">
+            <a:avLst/>
+          </a:prstGeom>
+          <a:solidFill>
+            <a:schemeClr val="bg2"/>
+          </a:solidFill>
+          <a:ln>
+            <a:solidFill>
+              <a:schemeClr val="bg2"/>
+            </a:solidFill>
+          </a:ln>
+        </p:spPr>
+        <p:style>
+          <a:lnRef idx="2">
+            <a:schemeClr val="accent1">
+              <a:shade val="50000"/>
+            </a:schemeClr>
+          </a:lnRef>
+          <a:fillRef idx="1">
+            <a:schemeClr val="accent1"/>
+          </a:fillRef>
+          <a:effectRef idx="0">
+            <a:schemeClr val="accent1"/>
+          </a:effectRef>
+          <a:fontRef idx="minor">
+            <a:schemeClr val="lt1"/>
+          </a:fontRef>
+        </p:style>
+        <p:txBody>
+          <a:bodyPr rtlCol="0" anchor="ctr"/>
+          <a:lstStyle/>
+          <a:p>
+            <a:pPr algn="ctr"/>
+            <a:r>
+              <a:rPr lang="ko-KR" altLang="en-US" sz="900" dirty="0" err="1" smtClean="0">
+                <a:solidFill>
+                  <a:schemeClr val="tx1"/>
+                </a:solidFill>
+              </a:rPr>
+              <a:t>더보기</a:t>
+            </a:r>
+            <a:endParaRPr lang="ko-KR" altLang="en-US" sz="900" dirty="0">
+              <a:solidFill>
+                <a:schemeClr val="tx1"/>
+              </a:solidFill>
+            </a:endParaRPr>
           </a:p>
         </p:txBody>
       </p:sp>

</xml_diff>